<commit_message>
Work on weeks 7 and 8
</commit_message>
<xml_diff>
--- a/Keynote/7.hyperparam-tuning.pptx
+++ b/Keynote/7.hyperparam-tuning.pptx
@@ -7,14 +7,27 @@
   <p:sldIdLst>
     <p:sldId id="266" r:id="rId2"/>
     <p:sldId id="267" r:id="rId3"/>
-    <p:sldId id="268" r:id="rId4"/>
-    <p:sldId id="269" r:id="rId5"/>
-    <p:sldId id="270" r:id="rId6"/>
-    <p:sldId id="271" r:id="rId7"/>
-    <p:sldId id="272" r:id="rId8"/>
-    <p:sldId id="273" r:id="rId9"/>
-    <p:sldId id="274" r:id="rId10"/>
-    <p:sldId id="275" r:id="rId11"/>
+    <p:sldId id="279" r:id="rId4"/>
+    <p:sldId id="268" r:id="rId5"/>
+    <p:sldId id="278" r:id="rId6"/>
+    <p:sldId id="269" r:id="rId7"/>
+    <p:sldId id="276" r:id="rId8"/>
+    <p:sldId id="270" r:id="rId9"/>
+    <p:sldId id="277" r:id="rId10"/>
+    <p:sldId id="271" r:id="rId11"/>
+    <p:sldId id="280" r:id="rId12"/>
+    <p:sldId id="281" r:id="rId13"/>
+    <p:sldId id="282" r:id="rId14"/>
+    <p:sldId id="272" r:id="rId15"/>
+    <p:sldId id="288" r:id="rId16"/>
+    <p:sldId id="273" r:id="rId17"/>
+    <p:sldId id="283" r:id="rId18"/>
+    <p:sldId id="284" r:id="rId19"/>
+    <p:sldId id="274" r:id="rId20"/>
+    <p:sldId id="286" r:id="rId21"/>
+    <p:sldId id="285" r:id="rId22"/>
+    <p:sldId id="287" r:id="rId23"/>
+    <p:sldId id="275" r:id="rId24"/>
   </p:sldIdLst>
   <p:sldSz cx="12192000" cy="6858000"/>
   <p:notesSz cx="6858000" cy="9144000"/>
@@ -113,6 +126,11 @@
       </a:defRPr>
     </a:lvl9pPr>
   </p:defaultTextStyle>
+  <p:extLst>
+    <p:ext uri="{EFAFB233-063F-42B5-8137-9DF3F51BA10A}">
+      <p15:sldGuideLst xmlns:p15="http://schemas.microsoft.com/office/powerpoint/2012/main"/>
+    </p:ext>
+  </p:extLst>
 </p:presentation>
 </file>
 
@@ -263,7 +281,7 @@
           <a:p>
             <a:fld id="{E43C3D67-E41A-49CD-A81C-4E2A886E7BC5}" type="datetimeFigureOut">
               <a:rPr lang="nl-NL" smtClean="0"/>
-              <a:t>20-10-2023</a:t>
+              <a:t>23-10-2023</a:t>
             </a:fld>
             <a:endParaRPr lang="nl-NL"/>
           </a:p>
@@ -461,7 +479,7 @@
           <a:p>
             <a:fld id="{E43C3D67-E41A-49CD-A81C-4E2A886E7BC5}" type="datetimeFigureOut">
               <a:rPr lang="nl-NL" smtClean="0"/>
-              <a:t>20-10-2023</a:t>
+              <a:t>23-10-2023</a:t>
             </a:fld>
             <a:endParaRPr lang="nl-NL"/>
           </a:p>
@@ -669,7 +687,7 @@
           <a:p>
             <a:fld id="{E43C3D67-E41A-49CD-A81C-4E2A886E7BC5}" type="datetimeFigureOut">
               <a:rPr lang="nl-NL" smtClean="0"/>
-              <a:t>20-10-2023</a:t>
+              <a:t>23-10-2023</a:t>
             </a:fld>
             <a:endParaRPr lang="nl-NL"/>
           </a:p>
@@ -924,7 +942,7 @@
           <a:p>
             <a:fld id="{E43C3D67-E41A-49CD-A81C-4E2A886E7BC5}" type="datetimeFigureOut">
               <a:rPr lang="nl-NL" smtClean="0"/>
-              <a:t>20-10-2023</a:t>
+              <a:t>23-10-2023</a:t>
             </a:fld>
             <a:endParaRPr lang="nl-NL"/>
           </a:p>
@@ -1199,7 +1217,7 @@
           <a:p>
             <a:fld id="{E43C3D67-E41A-49CD-A81C-4E2A886E7BC5}" type="datetimeFigureOut">
               <a:rPr lang="nl-NL" smtClean="0"/>
-              <a:t>20-10-2023</a:t>
+              <a:t>23-10-2023</a:t>
             </a:fld>
             <a:endParaRPr lang="nl-NL"/>
           </a:p>
@@ -1464,7 +1482,7 @@
           <a:p>
             <a:fld id="{E43C3D67-E41A-49CD-A81C-4E2A886E7BC5}" type="datetimeFigureOut">
               <a:rPr lang="nl-NL" smtClean="0"/>
-              <a:t>20-10-2023</a:t>
+              <a:t>23-10-2023</a:t>
             </a:fld>
             <a:endParaRPr lang="nl-NL"/>
           </a:p>
@@ -1876,7 +1894,7 @@
           <a:p>
             <a:fld id="{E43C3D67-E41A-49CD-A81C-4E2A886E7BC5}" type="datetimeFigureOut">
               <a:rPr lang="nl-NL" smtClean="0"/>
-              <a:t>20-10-2023</a:t>
+              <a:t>23-10-2023</a:t>
             </a:fld>
             <a:endParaRPr lang="nl-NL"/>
           </a:p>
@@ -2017,7 +2035,7 @@
           <a:p>
             <a:fld id="{E43C3D67-E41A-49CD-A81C-4E2A886E7BC5}" type="datetimeFigureOut">
               <a:rPr lang="nl-NL" smtClean="0"/>
-              <a:t>20-10-2023</a:t>
+              <a:t>23-10-2023</a:t>
             </a:fld>
             <a:endParaRPr lang="nl-NL"/>
           </a:p>
@@ -2130,7 +2148,7 @@
           <a:p>
             <a:fld id="{E43C3D67-E41A-49CD-A81C-4E2A886E7BC5}" type="datetimeFigureOut">
               <a:rPr lang="nl-NL" smtClean="0"/>
-              <a:t>20-10-2023</a:t>
+              <a:t>23-10-2023</a:t>
             </a:fld>
             <a:endParaRPr lang="nl-NL"/>
           </a:p>
@@ -2441,7 +2459,7 @@
           <a:p>
             <a:fld id="{E43C3D67-E41A-49CD-A81C-4E2A886E7BC5}" type="datetimeFigureOut">
               <a:rPr lang="nl-NL" smtClean="0"/>
-              <a:t>20-10-2023</a:t>
+              <a:t>23-10-2023</a:t>
             </a:fld>
             <a:endParaRPr lang="nl-NL"/>
           </a:p>
@@ -2729,7 +2747,7 @@
           <a:p>
             <a:fld id="{E43C3D67-E41A-49CD-A81C-4E2A886E7BC5}" type="datetimeFigureOut">
               <a:rPr lang="nl-NL" smtClean="0"/>
-              <a:t>20-10-2023</a:t>
+              <a:t>23-10-2023</a:t>
             </a:fld>
             <a:endParaRPr lang="nl-NL"/>
           </a:p>
@@ -2970,7 +2988,7 @@
           <a:p>
             <a:fld id="{E43C3D67-E41A-49CD-A81C-4E2A886E7BC5}" type="datetimeFigureOut">
               <a:rPr lang="nl-NL" smtClean="0"/>
-              <a:t>20-10-2023</a:t>
+              <a:t>23-10-2023</a:t>
             </a:fld>
             <a:endParaRPr lang="nl-NL"/>
           </a:p>
@@ -3554,7 +3572,7 @@
           <p:cNvPr id="2" name="Titel 1">
             <a:extLst>
               <a:ext uri="{FF2B5EF4-FFF2-40B4-BE49-F238E27FC236}">
-                <a16:creationId xmlns:a16="http://schemas.microsoft.com/office/drawing/2014/main" id="{9ABC7D18-85A4-9BC0-4B53-2475FA87050A}"/>
+                <a16:creationId xmlns:a16="http://schemas.microsoft.com/office/drawing/2014/main" id="{45722B26-A584-039F-4101-5FA1FF367A7E}"/>
               </a:ext>
             </a:extLst>
           </p:cNvPr>
@@ -3572,7 +3590,7 @@
           <a:p>
             <a:r>
               <a:rPr lang="nl-NL"/>
-              <a:t>PCA met sklearn</a:t>
+              <a:t>Halving</a:t>
             </a:r>
           </a:p>
         </p:txBody>
@@ -3582,7 +3600,7 @@
           <p:cNvPr id="3" name="Tijdelijke aanduiding voor inhoud 2">
             <a:extLst>
               <a:ext uri="{FF2B5EF4-FFF2-40B4-BE49-F238E27FC236}">
-                <a16:creationId xmlns:a16="http://schemas.microsoft.com/office/drawing/2014/main" id="{610C27AC-F2E4-2AB8-9E7F-010652D767C1}"/>
+                <a16:creationId xmlns:a16="http://schemas.microsoft.com/office/drawing/2014/main" id="{1FA549B8-2056-C987-D229-C7DF8D1ACE5C}"/>
               </a:ext>
             </a:extLst>
           </p:cNvPr>
@@ -3600,7 +3618,56 @@
           <a:p>
             <a:r>
               <a:rPr lang="nl-NL"/>
-              <a:t>Na de pauze: live coding Notebook</a:t>
+              <a:t>HalvingGridSearchCV en HalvingRandomSearchCV</a:t>
+            </a:r>
+          </a:p>
+          <a:p>
+            <a:r>
+              <a:rPr lang="nl-NL"/>
+              <a:t>Werken in rondes:</a:t>
+            </a:r>
+          </a:p>
+          <a:p>
+            <a:pPr lvl="1"/>
+            <a:r>
+              <a:rPr lang="nl-NL"/>
+              <a:t>In de eerste ronde wordt een groot aantal combinaties van parameters gegenereerd</a:t>
+            </a:r>
+          </a:p>
+          <a:p>
+            <a:pPr lvl="1"/>
+            <a:r>
+              <a:rPr lang="nl-NL"/>
+              <a:t>Van elke combinatie wordt een model gemaakt</a:t>
+            </a:r>
+          </a:p>
+          <a:p>
+            <a:pPr lvl="1"/>
+            <a:r>
+              <a:rPr lang="nl-NL"/>
+              <a:t>Modellen worden getraind op een kleine </a:t>
+            </a:r>
+            <a:r>
+              <a:rPr lang="nl-NL" b="1"/>
+              <a:t>subset</a:t>
+            </a:r>
+            <a:r>
+              <a:rPr lang="nl-NL"/>
+              <a:t> van de trainingsdata =&gt; minder resources nodig</a:t>
+            </a:r>
+          </a:p>
+          <a:p>
+            <a:pPr lvl="1"/>
+            <a:r>
+              <a:rPr lang="nl-NL"/>
+              <a:t>Alleen de beste modellen (1/factor) gaan door naar de volgende ronde</a:t>
+            </a:r>
+          </a:p>
+          <a:p>
+            <a:pPr lvl="1"/>
+            <a:r>
+              <a:rPr lang="nl-NL"/>
+              <a:t>Elke ronde minder modellen en een grotere trainingsset = meer resources</a:t>
             </a:r>
           </a:p>
         </p:txBody>
@@ -3608,7 +3675,1429 @@
     </p:spTree>
     <p:extLst>
       <p:ext uri="{BB962C8B-B14F-4D97-AF65-F5344CB8AC3E}">
-        <p14:creationId xmlns:p14="http://schemas.microsoft.com/office/powerpoint/2010/main" val="2578526049"/>
+        <p14:creationId xmlns:p14="http://schemas.microsoft.com/office/powerpoint/2010/main" val="3441588839"/>
+      </p:ext>
+    </p:extLst>
+  </p:cSld>
+  <p:clrMapOvr>
+    <a:masterClrMapping/>
+  </p:clrMapOvr>
+</p:sld>
+</file>
+
+<file path=ppt/slides/slide11.xml><?xml version="1.0" encoding="utf-8"?>
+<p:sld xmlns:a="http://schemas.openxmlformats.org/drawingml/2006/main" xmlns:r="http://schemas.openxmlformats.org/officeDocument/2006/relationships" xmlns:p="http://schemas.openxmlformats.org/presentationml/2006/main">
+  <p:cSld>
+    <p:spTree>
+      <p:nvGrpSpPr>
+        <p:cNvPr id="1" name=""/>
+        <p:cNvGrpSpPr/>
+        <p:nvPr/>
+      </p:nvGrpSpPr>
+      <p:grpSpPr>
+        <a:xfrm>
+          <a:off x="0" y="0"/>
+          <a:ext cx="0" cy="0"/>
+          <a:chOff x="0" y="0"/>
+          <a:chExt cx="0" cy="0"/>
+        </a:xfrm>
+      </p:grpSpPr>
+      <p:sp>
+        <p:nvSpPr>
+          <p:cNvPr id="2" name="Titel 1">
+            <a:extLst>
+              <a:ext uri="{FF2B5EF4-FFF2-40B4-BE49-F238E27FC236}">
+                <a16:creationId xmlns:a16="http://schemas.microsoft.com/office/drawing/2014/main" id="{E94D3AEE-F706-A554-0A75-9FB5839058D5}"/>
+              </a:ext>
+            </a:extLst>
+          </p:cNvPr>
+          <p:cNvSpPr>
+            <a:spLocks noGrp="1"/>
+          </p:cNvSpPr>
+          <p:nvPr>
+            <p:ph type="title"/>
+          </p:nvPr>
+        </p:nvSpPr>
+        <p:spPr/>
+        <p:txBody>
+          <a:bodyPr/>
+          <a:lstStyle/>
+          <a:p>
+            <a:r>
+              <a:rPr lang="nl-NL"/>
+              <a:t>Halving in code</a:t>
+            </a:r>
+          </a:p>
+        </p:txBody>
+      </p:sp>
+      <p:pic>
+        <p:nvPicPr>
+          <p:cNvPr id="5" name="Afbeelding 4">
+            <a:extLst>
+              <a:ext uri="{FF2B5EF4-FFF2-40B4-BE49-F238E27FC236}">
+                <a16:creationId xmlns:a16="http://schemas.microsoft.com/office/drawing/2014/main" id="{C4E8F56F-C631-9F8D-D766-AE91E5D7C8DC}"/>
+              </a:ext>
+            </a:extLst>
+          </p:cNvPr>
+          <p:cNvPicPr>
+            <a:picLocks noChangeAspect="1"/>
+          </p:cNvPicPr>
+          <p:nvPr/>
+        </p:nvPicPr>
+        <p:blipFill>
+          <a:blip r:embed="rId2"/>
+          <a:stretch>
+            <a:fillRect/>
+          </a:stretch>
+        </p:blipFill>
+        <p:spPr>
+          <a:xfrm>
+            <a:off x="451650" y="1650106"/>
+            <a:ext cx="11288700" cy="1991003"/>
+          </a:xfrm>
+          <a:prstGeom prst="rect">
+            <a:avLst/>
+          </a:prstGeom>
+        </p:spPr>
+      </p:pic>
+      <p:pic>
+        <p:nvPicPr>
+          <p:cNvPr id="7" name="Afbeelding 6">
+            <a:extLst>
+              <a:ext uri="{FF2B5EF4-FFF2-40B4-BE49-F238E27FC236}">
+                <a16:creationId xmlns:a16="http://schemas.microsoft.com/office/drawing/2014/main" id="{1AEEEA08-AE3C-1EB4-47E6-50FF22E10BBA}"/>
+              </a:ext>
+            </a:extLst>
+          </p:cNvPr>
+          <p:cNvPicPr>
+            <a:picLocks noChangeAspect="1"/>
+          </p:cNvPicPr>
+          <p:nvPr/>
+        </p:nvPicPr>
+        <p:blipFill>
+          <a:blip r:embed="rId3"/>
+          <a:stretch>
+            <a:fillRect/>
+          </a:stretch>
+        </p:blipFill>
+        <p:spPr>
+          <a:xfrm>
+            <a:off x="451650" y="3946170"/>
+            <a:ext cx="11317279" cy="2019582"/>
+          </a:xfrm>
+          <a:prstGeom prst="rect">
+            <a:avLst/>
+          </a:prstGeom>
+        </p:spPr>
+      </p:pic>
+    </p:spTree>
+    <p:extLst>
+      <p:ext uri="{BB962C8B-B14F-4D97-AF65-F5344CB8AC3E}">
+        <p14:creationId xmlns:p14="http://schemas.microsoft.com/office/powerpoint/2010/main" val="3573765330"/>
+      </p:ext>
+    </p:extLst>
+  </p:cSld>
+  <p:clrMapOvr>
+    <a:masterClrMapping/>
+  </p:clrMapOvr>
+</p:sld>
+</file>
+
+<file path=ppt/slides/slide12.xml><?xml version="1.0" encoding="utf-8"?>
+<p:sld xmlns:a="http://schemas.openxmlformats.org/drawingml/2006/main" xmlns:r="http://schemas.openxmlformats.org/officeDocument/2006/relationships" xmlns:p="http://schemas.openxmlformats.org/presentationml/2006/main">
+  <p:cSld>
+    <p:spTree>
+      <p:nvGrpSpPr>
+        <p:cNvPr id="1" name=""/>
+        <p:cNvGrpSpPr/>
+        <p:nvPr/>
+      </p:nvGrpSpPr>
+      <p:grpSpPr>
+        <a:xfrm>
+          <a:off x="0" y="0"/>
+          <a:ext cx="0" cy="0"/>
+          <a:chOff x="0" y="0"/>
+          <a:chExt cx="0" cy="0"/>
+        </a:xfrm>
+      </p:grpSpPr>
+      <p:sp>
+        <p:nvSpPr>
+          <p:cNvPr id="2" name="Titel 1">
+            <a:extLst>
+              <a:ext uri="{FF2B5EF4-FFF2-40B4-BE49-F238E27FC236}">
+                <a16:creationId xmlns:a16="http://schemas.microsoft.com/office/drawing/2014/main" id="{C2666C07-C5E4-6621-6695-051C40E575F3}"/>
+              </a:ext>
+            </a:extLst>
+          </p:cNvPr>
+          <p:cNvSpPr>
+            <a:spLocks noGrp="1"/>
+          </p:cNvSpPr>
+          <p:nvPr>
+            <p:ph type="title"/>
+          </p:nvPr>
+        </p:nvSpPr>
+        <p:spPr/>
+        <p:txBody>
+          <a:bodyPr/>
+          <a:lstStyle/>
+          <a:p>
+            <a:r>
+              <a:rPr lang="nl-NL"/>
+              <a:t>Intermezzo: live coding</a:t>
+            </a:r>
+          </a:p>
+        </p:txBody>
+      </p:sp>
+      <p:sp>
+        <p:nvSpPr>
+          <p:cNvPr id="3" name="Tijdelijke aanduiding voor inhoud 2">
+            <a:extLst>
+              <a:ext uri="{FF2B5EF4-FFF2-40B4-BE49-F238E27FC236}">
+                <a16:creationId xmlns:a16="http://schemas.microsoft.com/office/drawing/2014/main" id="{1E900621-D636-23B8-651C-B20206A2ADF4}"/>
+              </a:ext>
+            </a:extLst>
+          </p:cNvPr>
+          <p:cNvSpPr>
+            <a:spLocks noGrp="1"/>
+          </p:cNvSpPr>
+          <p:nvPr>
+            <p:ph idx="1"/>
+          </p:nvPr>
+        </p:nvSpPr>
+        <p:spPr>
+          <a:xfrm>
+            <a:off x="838200" y="1825625"/>
+            <a:ext cx="10515600" cy="748899"/>
+          </a:xfrm>
+        </p:spPr>
+        <p:txBody>
+          <a:bodyPr/>
+          <a:lstStyle/>
+          <a:p>
+            <a:r>
+              <a:rPr lang="nl-NL"/>
+              <a:t>Notebook over (Halving) Grid &amp; Randomized Search</a:t>
+            </a:r>
+          </a:p>
+        </p:txBody>
+      </p:sp>
+      <p:pic>
+        <p:nvPicPr>
+          <p:cNvPr id="2050" name="Picture 2" descr="Technology - Logos Download">
+            <a:extLst>
+              <a:ext uri="{FF2B5EF4-FFF2-40B4-BE49-F238E27FC236}">
+                <a16:creationId xmlns:a16="http://schemas.microsoft.com/office/drawing/2014/main" id="{5541AD79-57AF-EB5C-7DD7-04948C4525D7}"/>
+              </a:ext>
+            </a:extLst>
+          </p:cNvPr>
+          <p:cNvPicPr>
+            <a:picLocks noChangeAspect="1" noChangeArrowheads="1"/>
+          </p:cNvPicPr>
+          <p:nvPr/>
+        </p:nvPicPr>
+        <p:blipFill>
+          <a:blip r:embed="rId2">
+            <a:extLst>
+              <a:ext uri="{28A0092B-C50C-407E-A947-70E740481C1C}">
+                <a14:useLocalDpi xmlns:a14="http://schemas.microsoft.com/office/drawing/2010/main" val="0"/>
+              </a:ext>
+            </a:extLst>
+          </a:blip>
+          <a:srcRect/>
+          <a:stretch>
+            <a:fillRect/>
+          </a:stretch>
+        </p:blipFill>
+        <p:spPr bwMode="auto">
+          <a:xfrm>
+            <a:off x="5124007" y="3429000"/>
+            <a:ext cx="1943986" cy="2277121"/>
+          </a:xfrm>
+          <a:prstGeom prst="rect">
+            <a:avLst/>
+          </a:prstGeom>
+          <a:noFill/>
+          <a:extLst>
+            <a:ext uri="{909E8E84-426E-40DD-AFC4-6F175D3DCCD1}">
+              <a14:hiddenFill xmlns:a14="http://schemas.microsoft.com/office/drawing/2010/main">
+                <a:solidFill>
+                  <a:srgbClr val="FFFFFF"/>
+                </a:solidFill>
+              </a14:hiddenFill>
+            </a:ext>
+          </a:extLst>
+        </p:spPr>
+      </p:pic>
+    </p:spTree>
+    <p:extLst>
+      <p:ext uri="{BB962C8B-B14F-4D97-AF65-F5344CB8AC3E}">
+        <p14:creationId xmlns:p14="http://schemas.microsoft.com/office/powerpoint/2010/main" val="4229040097"/>
+      </p:ext>
+    </p:extLst>
+  </p:cSld>
+  <p:clrMapOvr>
+    <a:masterClrMapping/>
+  </p:clrMapOvr>
+</p:sld>
+</file>
+
+<file path=ppt/slides/slide13.xml><?xml version="1.0" encoding="utf-8"?>
+<p:sld xmlns:a="http://schemas.openxmlformats.org/drawingml/2006/main" xmlns:r="http://schemas.openxmlformats.org/officeDocument/2006/relationships" xmlns:p="http://schemas.openxmlformats.org/presentationml/2006/main">
+  <p:cSld>
+    <p:spTree>
+      <p:nvGrpSpPr>
+        <p:cNvPr id="1" name=""/>
+        <p:cNvGrpSpPr/>
+        <p:nvPr/>
+      </p:nvGrpSpPr>
+      <p:grpSpPr>
+        <a:xfrm>
+          <a:off x="0" y="0"/>
+          <a:ext cx="0" cy="0"/>
+          <a:chOff x="0" y="0"/>
+          <a:chExt cx="0" cy="0"/>
+        </a:xfrm>
+      </p:grpSpPr>
+      <p:sp>
+        <p:nvSpPr>
+          <p:cNvPr id="2" name="Titel 1">
+            <a:extLst>
+              <a:ext uri="{FF2B5EF4-FFF2-40B4-BE49-F238E27FC236}">
+                <a16:creationId xmlns:a16="http://schemas.microsoft.com/office/drawing/2014/main" id="{7BB87469-D4B6-0286-51B3-85E071B52A61}"/>
+              </a:ext>
+            </a:extLst>
+          </p:cNvPr>
+          <p:cNvSpPr>
+            <a:spLocks noGrp="1"/>
+          </p:cNvSpPr>
+          <p:nvPr>
+            <p:ph type="title"/>
+          </p:nvPr>
+        </p:nvSpPr>
+        <p:spPr/>
+        <p:txBody>
+          <a:bodyPr/>
+          <a:lstStyle/>
+          <a:p>
+            <a:r>
+              <a:rPr lang="nl-NL"/>
+              <a:t>Dimensionality: Blessing or Curse?</a:t>
+            </a:r>
+          </a:p>
+        </p:txBody>
+      </p:sp>
+      <p:pic>
+        <p:nvPicPr>
+          <p:cNvPr id="3074" name="Picture 2" descr="The Curse of Dimensionality | CommonLounge Archive">
+            <a:extLst>
+              <a:ext uri="{FF2B5EF4-FFF2-40B4-BE49-F238E27FC236}">
+                <a16:creationId xmlns:a16="http://schemas.microsoft.com/office/drawing/2014/main" id="{2C2AF2B4-680F-DAA8-91F5-1F12A12C9A04}"/>
+              </a:ext>
+            </a:extLst>
+          </p:cNvPr>
+          <p:cNvPicPr>
+            <a:picLocks noChangeAspect="1" noChangeArrowheads="1"/>
+          </p:cNvPicPr>
+          <p:nvPr/>
+        </p:nvPicPr>
+        <p:blipFill>
+          <a:blip r:embed="rId2">
+            <a:extLst>
+              <a:ext uri="{28A0092B-C50C-407E-A947-70E740481C1C}">
+                <a14:useLocalDpi xmlns:a14="http://schemas.microsoft.com/office/drawing/2010/main" val="0"/>
+              </a:ext>
+            </a:extLst>
+          </a:blip>
+          <a:srcRect/>
+          <a:stretch>
+            <a:fillRect/>
+          </a:stretch>
+        </p:blipFill>
+        <p:spPr bwMode="auto">
+          <a:xfrm>
+            <a:off x="1397160" y="2592280"/>
+            <a:ext cx="9397679" cy="3179548"/>
+          </a:xfrm>
+          <a:prstGeom prst="rect">
+            <a:avLst/>
+          </a:prstGeom>
+          <a:noFill/>
+          <a:extLst>
+            <a:ext uri="{909E8E84-426E-40DD-AFC4-6F175D3DCCD1}">
+              <a14:hiddenFill xmlns:a14="http://schemas.microsoft.com/office/drawing/2010/main">
+                <a:solidFill>
+                  <a:srgbClr val="FFFFFF"/>
+                </a:solidFill>
+              </a14:hiddenFill>
+            </a:ext>
+          </a:extLst>
+        </p:spPr>
+      </p:pic>
+      <p:sp>
+        <p:nvSpPr>
+          <p:cNvPr id="4" name="Tekstvak 3">
+            <a:extLst>
+              <a:ext uri="{FF2B5EF4-FFF2-40B4-BE49-F238E27FC236}">
+                <a16:creationId xmlns:a16="http://schemas.microsoft.com/office/drawing/2014/main" id="{692CBDFB-0BBB-2BE4-9B2B-1AF170B7A2AB}"/>
+              </a:ext>
+            </a:extLst>
+          </p:cNvPr>
+          <p:cNvSpPr txBox="1"/>
+          <p:nvPr/>
+        </p:nvSpPr>
+        <p:spPr>
+          <a:xfrm>
+            <a:off x="8140417" y="5771828"/>
+            <a:ext cx="2654422" cy="369332"/>
+          </a:xfrm>
+          <a:prstGeom prst="rect">
+            <a:avLst/>
+          </a:prstGeom>
+          <a:noFill/>
+        </p:spPr>
+        <p:txBody>
+          <a:bodyPr wrap="square" rtlCol="0">
+            <a:spAutoFit/>
+          </a:bodyPr>
+          <a:lstStyle/>
+          <a:p>
+            <a:r>
+              <a:rPr lang="nl-NL" i="1"/>
+              <a:t>Bron: commonlounge.com</a:t>
+            </a:r>
+          </a:p>
+        </p:txBody>
+      </p:sp>
+    </p:spTree>
+    <p:extLst>
+      <p:ext uri="{BB962C8B-B14F-4D97-AF65-F5344CB8AC3E}">
+        <p14:creationId xmlns:p14="http://schemas.microsoft.com/office/powerpoint/2010/main" val="1483644058"/>
+      </p:ext>
+    </p:extLst>
+  </p:cSld>
+  <p:clrMapOvr>
+    <a:masterClrMapping/>
+  </p:clrMapOvr>
+</p:sld>
+</file>
+
+<file path=ppt/slides/slide14.xml><?xml version="1.0" encoding="utf-8"?>
+<p:sld xmlns:a="http://schemas.openxmlformats.org/drawingml/2006/main" xmlns:r="http://schemas.openxmlformats.org/officeDocument/2006/relationships" xmlns:p="http://schemas.openxmlformats.org/presentationml/2006/main">
+  <p:cSld>
+    <p:spTree>
+      <p:nvGrpSpPr>
+        <p:cNvPr id="1" name=""/>
+        <p:cNvGrpSpPr/>
+        <p:nvPr/>
+      </p:nvGrpSpPr>
+      <p:grpSpPr>
+        <a:xfrm>
+          <a:off x="0" y="0"/>
+          <a:ext cx="0" cy="0"/>
+          <a:chOff x="0" y="0"/>
+          <a:chExt cx="0" cy="0"/>
+        </a:xfrm>
+      </p:grpSpPr>
+      <p:sp>
+        <p:nvSpPr>
+          <p:cNvPr id="2" name="Titel 1">
+            <a:extLst>
+              <a:ext uri="{FF2B5EF4-FFF2-40B4-BE49-F238E27FC236}">
+                <a16:creationId xmlns:a16="http://schemas.microsoft.com/office/drawing/2014/main" id="{13E9BECA-5360-E53A-5C51-FF4BA7D9E8A2}"/>
+              </a:ext>
+            </a:extLst>
+          </p:cNvPr>
+          <p:cNvSpPr>
+            <a:spLocks noGrp="1"/>
+          </p:cNvSpPr>
+          <p:nvPr>
+            <p:ph type="title"/>
+          </p:nvPr>
+        </p:nvSpPr>
+        <p:spPr/>
+        <p:txBody>
+          <a:bodyPr/>
+          <a:lstStyle/>
+          <a:p>
+            <a:r>
+              <a:rPr lang="nl-NL"/>
+              <a:t>Curse of Dimensionality</a:t>
+            </a:r>
+          </a:p>
+        </p:txBody>
+      </p:sp>
+      <p:sp>
+        <p:nvSpPr>
+          <p:cNvPr id="3" name="Tijdelijke aanduiding voor inhoud 2">
+            <a:extLst>
+              <a:ext uri="{FF2B5EF4-FFF2-40B4-BE49-F238E27FC236}">
+                <a16:creationId xmlns:a16="http://schemas.microsoft.com/office/drawing/2014/main" id="{2A8132DF-23B2-2304-E396-B660D0CB0F9F}"/>
+              </a:ext>
+            </a:extLst>
+          </p:cNvPr>
+          <p:cNvSpPr>
+            <a:spLocks noGrp="1"/>
+          </p:cNvSpPr>
+          <p:nvPr>
+            <p:ph idx="1"/>
+          </p:nvPr>
+        </p:nvSpPr>
+        <p:spPr/>
+        <p:txBody>
+          <a:bodyPr/>
+          <a:lstStyle/>
+          <a:p>
+            <a:r>
+              <a:rPr lang="nl-NL"/>
+              <a:t>Elke feature erbij betekent een extra dimensie</a:t>
+            </a:r>
+          </a:p>
+          <a:p>
+            <a:pPr lvl="1"/>
+            <a:r>
+              <a:rPr lang="nl-NL"/>
+              <a:t>Exponentiële groei</a:t>
+            </a:r>
+          </a:p>
+          <a:p>
+            <a:pPr lvl="1"/>
+            <a:r>
+              <a:rPr lang="nl-NL"/>
+              <a:t>Performance-problemen</a:t>
+            </a:r>
+          </a:p>
+          <a:p>
+            <a:r>
+              <a:rPr lang="nl-NL"/>
+              <a:t>Meer dimensies </a:t>
+            </a:r>
+            <a:r>
+              <a:rPr lang="nl-NL">
+                <a:sym typeface="Wingdings" panose="05000000000000000000" pitchFamily="2" charset="2"/>
+              </a:rPr>
+              <a:t> datapunten komen verder uit elkaar te liggen</a:t>
+            </a:r>
+          </a:p>
+          <a:p>
+            <a:pPr lvl="2"/>
+            <a:r>
+              <a:rPr lang="nl-NL">
+                <a:sym typeface="Wingdings" panose="05000000000000000000" pitchFamily="2" charset="2"/>
+              </a:rPr>
+              <a:t>2D-eenheidsvierkant: gem. afstand 0,52</a:t>
+            </a:r>
+          </a:p>
+          <a:p>
+            <a:pPr lvl="2"/>
+            <a:r>
+              <a:rPr lang="nl-NL">
+                <a:sym typeface="Wingdings" panose="05000000000000000000" pitchFamily="2" charset="2"/>
+              </a:rPr>
+              <a:t>3D-eenheidskubus: gem. afstand 0,66</a:t>
+            </a:r>
+          </a:p>
+          <a:p>
+            <a:pPr lvl="2"/>
+            <a:r>
+              <a:rPr lang="nl-NL">
+                <a:sym typeface="Wingdings" panose="05000000000000000000" pitchFamily="2" charset="2"/>
+              </a:rPr>
+              <a:t>1mD-eenheidshyperkubus: gem. afstand 408,25</a:t>
+            </a:r>
+          </a:p>
+          <a:p>
+            <a:pPr lvl="1"/>
+            <a:r>
+              <a:rPr lang="nl-NL"/>
+              <a:t>Data wordt steeds ijler/</a:t>
+            </a:r>
+            <a:r>
+              <a:rPr lang="nl-NL" i="1"/>
+              <a:t>sparser</a:t>
+            </a:r>
+          </a:p>
+          <a:p>
+            <a:pPr lvl="1"/>
+            <a:r>
+              <a:rPr lang="nl-NL" b="1"/>
+              <a:t>Exponentieel</a:t>
+            </a:r>
+            <a:r>
+              <a:rPr lang="nl-NL"/>
+              <a:t> meer data nodig, anders risico op </a:t>
+            </a:r>
+            <a:r>
+              <a:rPr lang="nl-NL" b="1"/>
+              <a:t>overfitting</a:t>
+            </a:r>
+            <a:r>
+              <a:rPr lang="nl-NL"/>
+              <a:t> van model</a:t>
+            </a:r>
+          </a:p>
+          <a:p>
+            <a:pPr lvl="1"/>
+            <a:r>
+              <a:rPr lang="nl-NL"/>
+              <a:t>Clustering wordt erg lastig</a:t>
+            </a:r>
+          </a:p>
+        </p:txBody>
+      </p:sp>
+    </p:spTree>
+    <p:extLst>
+      <p:ext uri="{BB962C8B-B14F-4D97-AF65-F5344CB8AC3E}">
+        <p14:creationId xmlns:p14="http://schemas.microsoft.com/office/powerpoint/2010/main" val="3928319084"/>
+      </p:ext>
+    </p:extLst>
+  </p:cSld>
+  <p:clrMapOvr>
+    <a:masterClrMapping/>
+  </p:clrMapOvr>
+</p:sld>
+</file>
+
+<file path=ppt/slides/slide15.xml><?xml version="1.0" encoding="utf-8"?>
+<p:sld xmlns:a="http://schemas.openxmlformats.org/drawingml/2006/main" xmlns:r="http://schemas.openxmlformats.org/officeDocument/2006/relationships" xmlns:p="http://schemas.openxmlformats.org/presentationml/2006/main">
+  <p:cSld>
+    <p:spTree>
+      <p:nvGrpSpPr>
+        <p:cNvPr id="1" name=""/>
+        <p:cNvGrpSpPr/>
+        <p:nvPr/>
+      </p:nvGrpSpPr>
+      <p:grpSpPr>
+        <a:xfrm>
+          <a:off x="0" y="0"/>
+          <a:ext cx="0" cy="0"/>
+          <a:chOff x="0" y="0"/>
+          <a:chExt cx="0" cy="0"/>
+        </a:xfrm>
+      </p:grpSpPr>
+      <p:sp>
+        <p:nvSpPr>
+          <p:cNvPr id="2" name="Titel 1">
+            <a:extLst>
+              <a:ext uri="{FF2B5EF4-FFF2-40B4-BE49-F238E27FC236}">
+                <a16:creationId xmlns:a16="http://schemas.microsoft.com/office/drawing/2014/main" id="{A18A6A23-8C56-845B-CEE8-F7375A1A684B}"/>
+              </a:ext>
+            </a:extLst>
+          </p:cNvPr>
+          <p:cNvSpPr>
+            <a:spLocks noGrp="1"/>
+          </p:cNvSpPr>
+          <p:nvPr>
+            <p:ph type="title"/>
+          </p:nvPr>
+        </p:nvSpPr>
+        <p:spPr/>
+        <p:txBody>
+          <a:bodyPr/>
+          <a:lstStyle/>
+          <a:p>
+            <a:r>
+              <a:rPr lang="nl-NL"/>
+              <a:t>Curse of Dimensionality</a:t>
+            </a:r>
+          </a:p>
+        </p:txBody>
+      </p:sp>
+      <p:sp>
+        <p:nvSpPr>
+          <p:cNvPr id="3" name="Tijdelijke aanduiding voor inhoud 2">
+            <a:extLst>
+              <a:ext uri="{FF2B5EF4-FFF2-40B4-BE49-F238E27FC236}">
+                <a16:creationId xmlns:a16="http://schemas.microsoft.com/office/drawing/2014/main" id="{962C0F37-D388-0E24-E2BE-E7D454AC51CA}"/>
+              </a:ext>
+            </a:extLst>
+          </p:cNvPr>
+          <p:cNvSpPr>
+            <a:spLocks noGrp="1"/>
+          </p:cNvSpPr>
+          <p:nvPr>
+            <p:ph idx="1"/>
+          </p:nvPr>
+        </p:nvSpPr>
+        <p:spPr>
+          <a:xfrm>
+            <a:off x="838200" y="1825625"/>
+            <a:ext cx="6352713" cy="4351338"/>
+          </a:xfrm>
+        </p:spPr>
+        <p:txBody>
+          <a:bodyPr/>
+          <a:lstStyle/>
+          <a:p>
+            <a:r>
+              <a:rPr lang="nl-NL"/>
+              <a:t>Grafisch uitgebeeld</a:t>
+            </a:r>
+          </a:p>
+          <a:p>
+            <a:pPr lvl="1"/>
+            <a:r>
+              <a:rPr lang="nl-NL"/>
+              <a:t>Stel je een bol voor</a:t>
+            </a:r>
+          </a:p>
+          <a:p>
+            <a:r>
+              <a:rPr lang="nl-NL"/>
+              <a:t>Percentage binnenin de bol:</a:t>
+            </a:r>
+          </a:p>
+          <a:p>
+            <a:pPr lvl="1"/>
+            <a:r>
+              <a:rPr lang="nl-NL"/>
+              <a:t>2D-vlak door het midden van de bol: 79%</a:t>
+            </a:r>
+          </a:p>
+          <a:p>
+            <a:pPr lvl="1"/>
+            <a:r>
+              <a:rPr lang="nl-NL"/>
+              <a:t>3D-kubus om bol heen: 52%</a:t>
+            </a:r>
+          </a:p>
+          <a:p>
+            <a:pPr lvl="1"/>
+            <a:r>
+              <a:rPr lang="nl-NL"/>
+              <a:t>10D-hyperkubus: 0,25%</a:t>
+            </a:r>
+          </a:p>
+        </p:txBody>
+      </p:sp>
+      <p:pic>
+        <p:nvPicPr>
+          <p:cNvPr id="5" name="Afbeelding 4">
+            <a:extLst>
+              <a:ext uri="{FF2B5EF4-FFF2-40B4-BE49-F238E27FC236}">
+                <a16:creationId xmlns:a16="http://schemas.microsoft.com/office/drawing/2014/main" id="{1DE23E4D-2CBE-1869-88FA-A045F50BD6B7}"/>
+              </a:ext>
+            </a:extLst>
+          </p:cNvPr>
+          <p:cNvPicPr>
+            <a:picLocks noChangeAspect="1"/>
+          </p:cNvPicPr>
+          <p:nvPr/>
+        </p:nvPicPr>
+        <p:blipFill>
+          <a:blip r:embed="rId2"/>
+          <a:stretch>
+            <a:fillRect/>
+          </a:stretch>
+        </p:blipFill>
+        <p:spPr>
+          <a:xfrm>
+            <a:off x="7429150" y="2184758"/>
+            <a:ext cx="4413661" cy="4308117"/>
+          </a:xfrm>
+          <a:prstGeom prst="rect">
+            <a:avLst/>
+          </a:prstGeom>
+        </p:spPr>
+      </p:pic>
+    </p:spTree>
+    <p:extLst>
+      <p:ext uri="{BB962C8B-B14F-4D97-AF65-F5344CB8AC3E}">
+        <p14:creationId xmlns:p14="http://schemas.microsoft.com/office/powerpoint/2010/main" val="1464542466"/>
+      </p:ext>
+    </p:extLst>
+  </p:cSld>
+  <p:clrMapOvr>
+    <a:masterClrMapping/>
+  </p:clrMapOvr>
+</p:sld>
+</file>
+
+<file path=ppt/slides/slide16.xml><?xml version="1.0" encoding="utf-8"?>
+<p:sld xmlns:a="http://schemas.openxmlformats.org/drawingml/2006/main" xmlns:r="http://schemas.openxmlformats.org/officeDocument/2006/relationships" xmlns:p="http://schemas.openxmlformats.org/presentationml/2006/main">
+  <p:cSld>
+    <p:spTree>
+      <p:nvGrpSpPr>
+        <p:cNvPr id="1" name=""/>
+        <p:cNvGrpSpPr/>
+        <p:nvPr/>
+      </p:nvGrpSpPr>
+      <p:grpSpPr>
+        <a:xfrm>
+          <a:off x="0" y="0"/>
+          <a:ext cx="0" cy="0"/>
+          <a:chOff x="0" y="0"/>
+          <a:chExt cx="0" cy="0"/>
+        </a:xfrm>
+      </p:grpSpPr>
+      <p:sp>
+        <p:nvSpPr>
+          <p:cNvPr id="2" name="Titel 1">
+            <a:extLst>
+              <a:ext uri="{FF2B5EF4-FFF2-40B4-BE49-F238E27FC236}">
+                <a16:creationId xmlns:a16="http://schemas.microsoft.com/office/drawing/2014/main" id="{5897A41E-F22D-AB5F-DEE3-284EDFDAC696}"/>
+              </a:ext>
+            </a:extLst>
+          </p:cNvPr>
+          <p:cNvSpPr>
+            <a:spLocks noGrp="1"/>
+          </p:cNvSpPr>
+          <p:nvPr>
+            <p:ph type="title"/>
+          </p:nvPr>
+        </p:nvSpPr>
+        <p:spPr/>
+        <p:txBody>
+          <a:bodyPr/>
+          <a:lstStyle/>
+          <a:p>
+            <a:r>
+              <a:rPr lang="nl-NL"/>
+              <a:t>Dimensionaliteitsreductie</a:t>
+            </a:r>
+          </a:p>
+        </p:txBody>
+      </p:sp>
+      <p:sp>
+        <p:nvSpPr>
+          <p:cNvPr id="3" name="Tijdelijke aanduiding voor inhoud 2">
+            <a:extLst>
+              <a:ext uri="{FF2B5EF4-FFF2-40B4-BE49-F238E27FC236}">
+                <a16:creationId xmlns:a16="http://schemas.microsoft.com/office/drawing/2014/main" id="{9905F51F-A9F8-341B-F521-B1150F2606DD}"/>
+              </a:ext>
+            </a:extLst>
+          </p:cNvPr>
+          <p:cNvSpPr>
+            <a:spLocks noGrp="1"/>
+          </p:cNvSpPr>
+          <p:nvPr>
+            <p:ph idx="1"/>
+          </p:nvPr>
+        </p:nvSpPr>
+        <p:spPr/>
+        <p:txBody>
+          <a:bodyPr/>
+          <a:lstStyle/>
+          <a:p>
+            <a:r>
+              <a:rPr lang="nl-NL"/>
+              <a:t>Problemen met performance, clustering en overfitting</a:t>
+            </a:r>
+          </a:p>
+          <a:p>
+            <a:r>
+              <a:rPr lang="nl-NL"/>
+              <a:t>Daarom: aantal dimensies terugbrengen</a:t>
+            </a:r>
+          </a:p>
+          <a:p>
+            <a:r>
+              <a:rPr lang="nl-NL"/>
+              <a:t>Diverse technieken</a:t>
+            </a:r>
+          </a:p>
+          <a:p>
+            <a:pPr lvl="1"/>
+            <a:r>
+              <a:rPr lang="nl-NL"/>
+              <a:t>Projectie</a:t>
+            </a:r>
+          </a:p>
+          <a:p>
+            <a:pPr lvl="1"/>
+            <a:r>
+              <a:rPr lang="nl-NL"/>
+              <a:t>Manifold Learning</a:t>
+            </a:r>
+          </a:p>
+          <a:p>
+            <a:pPr lvl="1"/>
+            <a:r>
+              <a:rPr lang="nl-NL"/>
+              <a:t>Principal Components Analysis</a:t>
+            </a:r>
+          </a:p>
+        </p:txBody>
+      </p:sp>
+    </p:spTree>
+    <p:extLst>
+      <p:ext uri="{BB962C8B-B14F-4D97-AF65-F5344CB8AC3E}">
+        <p14:creationId xmlns:p14="http://schemas.microsoft.com/office/powerpoint/2010/main" val="4092464840"/>
+      </p:ext>
+    </p:extLst>
+  </p:cSld>
+  <p:clrMapOvr>
+    <a:masterClrMapping/>
+  </p:clrMapOvr>
+</p:sld>
+</file>
+
+<file path=ppt/slides/slide17.xml><?xml version="1.0" encoding="utf-8"?>
+<p:sld xmlns:a="http://schemas.openxmlformats.org/drawingml/2006/main" xmlns:r="http://schemas.openxmlformats.org/officeDocument/2006/relationships" xmlns:p="http://schemas.openxmlformats.org/presentationml/2006/main">
+  <p:cSld>
+    <p:spTree>
+      <p:nvGrpSpPr>
+        <p:cNvPr id="1" name=""/>
+        <p:cNvGrpSpPr/>
+        <p:nvPr/>
+      </p:nvGrpSpPr>
+      <p:grpSpPr>
+        <a:xfrm>
+          <a:off x="0" y="0"/>
+          <a:ext cx="0" cy="0"/>
+          <a:chOff x="0" y="0"/>
+          <a:chExt cx="0" cy="0"/>
+        </a:xfrm>
+      </p:grpSpPr>
+      <p:sp>
+        <p:nvSpPr>
+          <p:cNvPr id="2" name="Titel 1">
+            <a:extLst>
+              <a:ext uri="{FF2B5EF4-FFF2-40B4-BE49-F238E27FC236}">
+                <a16:creationId xmlns:a16="http://schemas.microsoft.com/office/drawing/2014/main" id="{EECE31AD-5BD2-1313-7DFB-366DA2E723DE}"/>
+              </a:ext>
+            </a:extLst>
+          </p:cNvPr>
+          <p:cNvSpPr>
+            <a:spLocks noGrp="1"/>
+          </p:cNvSpPr>
+          <p:nvPr>
+            <p:ph type="title"/>
+          </p:nvPr>
+        </p:nvSpPr>
+        <p:spPr/>
+        <p:txBody>
+          <a:bodyPr/>
+          <a:lstStyle/>
+          <a:p>
+            <a:r>
+              <a:rPr lang="nl-NL"/>
+              <a:t>Projectie</a:t>
+            </a:r>
+          </a:p>
+        </p:txBody>
+      </p:sp>
+      <p:pic>
+        <p:nvPicPr>
+          <p:cNvPr id="4098" name="Picture 2">
+            <a:extLst>
+              <a:ext uri="{FF2B5EF4-FFF2-40B4-BE49-F238E27FC236}">
+                <a16:creationId xmlns:a16="http://schemas.microsoft.com/office/drawing/2014/main" id="{300D586A-0789-14EF-0C05-4C322899D4B7}"/>
+              </a:ext>
+            </a:extLst>
+          </p:cNvPr>
+          <p:cNvPicPr>
+            <a:picLocks noChangeAspect="1" noChangeArrowheads="1"/>
+          </p:cNvPicPr>
+          <p:nvPr/>
+        </p:nvPicPr>
+        <p:blipFill>
+          <a:blip r:embed="rId2">
+            <a:extLst>
+              <a:ext uri="{28A0092B-C50C-407E-A947-70E740481C1C}">
+                <a14:useLocalDpi xmlns:a14="http://schemas.microsoft.com/office/drawing/2010/main" val="0"/>
+              </a:ext>
+            </a:extLst>
+          </a:blip>
+          <a:srcRect/>
+          <a:stretch>
+            <a:fillRect/>
+          </a:stretch>
+        </p:blipFill>
+        <p:spPr bwMode="auto">
+          <a:xfrm>
+            <a:off x="3567112" y="1477347"/>
+            <a:ext cx="5057775" cy="4791075"/>
+          </a:xfrm>
+          <a:prstGeom prst="rect">
+            <a:avLst/>
+          </a:prstGeom>
+          <a:noFill/>
+          <a:extLst>
+            <a:ext uri="{909E8E84-426E-40DD-AFC4-6F175D3DCCD1}">
+              <a14:hiddenFill xmlns:a14="http://schemas.microsoft.com/office/drawing/2010/main">
+                <a:solidFill>
+                  <a:srgbClr val="FFFFFF"/>
+                </a:solidFill>
+              </a14:hiddenFill>
+            </a:ext>
+          </a:extLst>
+        </p:spPr>
+      </p:pic>
+    </p:spTree>
+    <p:extLst>
+      <p:ext uri="{BB962C8B-B14F-4D97-AF65-F5344CB8AC3E}">
+        <p14:creationId xmlns:p14="http://schemas.microsoft.com/office/powerpoint/2010/main" val="1486324022"/>
+      </p:ext>
+    </p:extLst>
+  </p:cSld>
+  <p:clrMapOvr>
+    <a:masterClrMapping/>
+  </p:clrMapOvr>
+</p:sld>
+</file>
+
+<file path=ppt/slides/slide18.xml><?xml version="1.0" encoding="utf-8"?>
+<p:sld xmlns:a="http://schemas.openxmlformats.org/drawingml/2006/main" xmlns:r="http://schemas.openxmlformats.org/officeDocument/2006/relationships" xmlns:p="http://schemas.openxmlformats.org/presentationml/2006/main">
+  <p:cSld>
+    <p:spTree>
+      <p:nvGrpSpPr>
+        <p:cNvPr id="1" name=""/>
+        <p:cNvGrpSpPr/>
+        <p:nvPr/>
+      </p:nvGrpSpPr>
+      <p:grpSpPr>
+        <a:xfrm>
+          <a:off x="0" y="0"/>
+          <a:ext cx="0" cy="0"/>
+          <a:chOff x="0" y="0"/>
+          <a:chExt cx="0" cy="0"/>
+        </a:xfrm>
+      </p:grpSpPr>
+      <p:sp>
+        <p:nvSpPr>
+          <p:cNvPr id="2" name="Titel 1">
+            <a:extLst>
+              <a:ext uri="{FF2B5EF4-FFF2-40B4-BE49-F238E27FC236}">
+                <a16:creationId xmlns:a16="http://schemas.microsoft.com/office/drawing/2014/main" id="{CFC6EC6C-3B0F-C19B-20FA-E1E485407CE4}"/>
+              </a:ext>
+            </a:extLst>
+          </p:cNvPr>
+          <p:cNvSpPr>
+            <a:spLocks noGrp="1"/>
+          </p:cNvSpPr>
+          <p:nvPr>
+            <p:ph type="title"/>
+          </p:nvPr>
+        </p:nvSpPr>
+        <p:spPr/>
+        <p:txBody>
+          <a:bodyPr/>
+          <a:lstStyle/>
+          <a:p>
+            <a:r>
+              <a:rPr lang="nl-NL"/>
+              <a:t>Manifold Learning</a:t>
+            </a:r>
+          </a:p>
+        </p:txBody>
+      </p:sp>
+      <p:pic>
+        <p:nvPicPr>
+          <p:cNvPr id="5122" name="Picture 2">
+            <a:extLst>
+              <a:ext uri="{FF2B5EF4-FFF2-40B4-BE49-F238E27FC236}">
+                <a16:creationId xmlns:a16="http://schemas.microsoft.com/office/drawing/2014/main" id="{49942822-FAA2-26FF-FD8B-3654026A609B}"/>
+              </a:ext>
+            </a:extLst>
+          </p:cNvPr>
+          <p:cNvPicPr>
+            <a:picLocks noChangeAspect="1" noChangeArrowheads="1"/>
+          </p:cNvPicPr>
+          <p:nvPr/>
+        </p:nvPicPr>
+        <p:blipFill>
+          <a:blip r:embed="rId2">
+            <a:extLst>
+              <a:ext uri="{28A0092B-C50C-407E-A947-70E740481C1C}">
+                <a14:useLocalDpi xmlns:a14="http://schemas.microsoft.com/office/drawing/2010/main" val="0"/>
+              </a:ext>
+            </a:extLst>
+          </a:blip>
+          <a:srcRect/>
+          <a:stretch>
+            <a:fillRect/>
+          </a:stretch>
+        </p:blipFill>
+        <p:spPr bwMode="auto">
+          <a:xfrm>
+            <a:off x="629067" y="1160386"/>
+            <a:ext cx="3476625" cy="3276600"/>
+          </a:xfrm>
+          <a:prstGeom prst="rect">
+            <a:avLst/>
+          </a:prstGeom>
+          <a:noFill/>
+          <a:extLst>
+            <a:ext uri="{909E8E84-426E-40DD-AFC4-6F175D3DCCD1}">
+              <a14:hiddenFill xmlns:a14="http://schemas.microsoft.com/office/drawing/2010/main">
+                <a:solidFill>
+                  <a:srgbClr val="FFFFFF"/>
+                </a:solidFill>
+              </a14:hiddenFill>
+            </a:ext>
+          </a:extLst>
+        </p:spPr>
+      </p:pic>
+      <p:pic>
+        <p:nvPicPr>
+          <p:cNvPr id="5124" name="Picture 4">
+            <a:extLst>
+              <a:ext uri="{FF2B5EF4-FFF2-40B4-BE49-F238E27FC236}">
+                <a16:creationId xmlns:a16="http://schemas.microsoft.com/office/drawing/2014/main" id="{0E8FEC65-630E-EA3B-4AB1-84C7A6CE8424}"/>
+              </a:ext>
+            </a:extLst>
+          </p:cNvPr>
+          <p:cNvPicPr>
+            <a:picLocks noChangeAspect="1" noChangeArrowheads="1"/>
+          </p:cNvPicPr>
+          <p:nvPr/>
+        </p:nvPicPr>
+        <p:blipFill>
+          <a:blip r:embed="rId3">
+            <a:extLst>
+              <a:ext uri="{28A0092B-C50C-407E-A947-70E740481C1C}">
+                <a14:useLocalDpi xmlns:a14="http://schemas.microsoft.com/office/drawing/2010/main" val="0"/>
+              </a:ext>
+            </a:extLst>
+          </a:blip>
+          <a:srcRect/>
+          <a:stretch>
+            <a:fillRect/>
+          </a:stretch>
+        </p:blipFill>
+        <p:spPr bwMode="auto">
+          <a:xfrm>
+            <a:off x="4572000" y="3545150"/>
+            <a:ext cx="6705600" cy="2590800"/>
+          </a:xfrm>
+          <a:prstGeom prst="rect">
+            <a:avLst/>
+          </a:prstGeom>
+          <a:noFill/>
+          <a:extLst>
+            <a:ext uri="{909E8E84-426E-40DD-AFC4-6F175D3DCCD1}">
+              <a14:hiddenFill xmlns:a14="http://schemas.microsoft.com/office/drawing/2010/main">
+                <a:solidFill>
+                  <a:srgbClr val="FFFFFF"/>
+                </a:solidFill>
+              </a14:hiddenFill>
+            </a:ext>
+          </a:extLst>
+        </p:spPr>
+      </p:pic>
+      <p:sp>
+        <p:nvSpPr>
+          <p:cNvPr id="4" name="Tekstvak 3">
+            <a:extLst>
+              <a:ext uri="{FF2B5EF4-FFF2-40B4-BE49-F238E27FC236}">
+                <a16:creationId xmlns:a16="http://schemas.microsoft.com/office/drawing/2014/main" id="{66599904-9FDE-7442-1F17-5F3E4D985027}"/>
+              </a:ext>
+            </a:extLst>
+          </p:cNvPr>
+          <p:cNvSpPr txBox="1"/>
+          <p:nvPr/>
+        </p:nvSpPr>
+        <p:spPr>
+          <a:xfrm>
+            <a:off x="4998128" y="6081204"/>
+            <a:ext cx="2956264" cy="369332"/>
+          </a:xfrm>
+          <a:prstGeom prst="rect">
+            <a:avLst/>
+          </a:prstGeom>
+          <a:noFill/>
+        </p:spPr>
+        <p:txBody>
+          <a:bodyPr wrap="square" rtlCol="0">
+            <a:spAutoFit/>
+          </a:bodyPr>
+          <a:lstStyle/>
+          <a:p>
+            <a:r>
+              <a:rPr lang="nl-NL"/>
+              <a:t>2D doorsnede, parallel aan x1</a:t>
+            </a:r>
+          </a:p>
+        </p:txBody>
+      </p:sp>
+      <p:sp>
+        <p:nvSpPr>
+          <p:cNvPr id="5" name="Tekstvak 4">
+            <a:extLst>
+              <a:ext uri="{FF2B5EF4-FFF2-40B4-BE49-F238E27FC236}">
+                <a16:creationId xmlns:a16="http://schemas.microsoft.com/office/drawing/2014/main" id="{1C34520E-89D1-103A-43C0-DEAF858979CF}"/>
+              </a:ext>
+            </a:extLst>
+          </p:cNvPr>
+          <p:cNvSpPr txBox="1"/>
+          <p:nvPr/>
+        </p:nvSpPr>
+        <p:spPr>
+          <a:xfrm>
+            <a:off x="8164496" y="6081204"/>
+            <a:ext cx="3775969" cy="369332"/>
+          </a:xfrm>
+          <a:prstGeom prst="rect">
+            <a:avLst/>
+          </a:prstGeom>
+          <a:noFill/>
+        </p:spPr>
+        <p:txBody>
+          <a:bodyPr wrap="square" rtlCol="0">
+            <a:spAutoFit/>
+          </a:bodyPr>
+          <a:lstStyle/>
+          <a:p>
+            <a:r>
+              <a:rPr lang="nl-NL"/>
+              <a:t>2D doorsnede, opgerold in de 3</a:t>
+            </a:r>
+            <a:r>
+              <a:rPr lang="nl-NL" baseline="30000"/>
+              <a:t>e</a:t>
+            </a:r>
+            <a:r>
+              <a:rPr lang="nl-NL"/>
+              <a:t> dim.</a:t>
+            </a:r>
+          </a:p>
+        </p:txBody>
+      </p:sp>
+    </p:spTree>
+    <p:extLst>
+      <p:ext uri="{BB962C8B-B14F-4D97-AF65-F5344CB8AC3E}">
+        <p14:creationId xmlns:p14="http://schemas.microsoft.com/office/powerpoint/2010/main" val="3187124472"/>
+      </p:ext>
+    </p:extLst>
+  </p:cSld>
+  <p:clrMapOvr>
+    <a:masterClrMapping/>
+  </p:clrMapOvr>
+</p:sld>
+</file>
+
+<file path=ppt/slides/slide19.xml><?xml version="1.0" encoding="utf-8"?>
+<p:sld xmlns:a="http://schemas.openxmlformats.org/drawingml/2006/main" xmlns:r="http://schemas.openxmlformats.org/officeDocument/2006/relationships" xmlns:p="http://schemas.openxmlformats.org/presentationml/2006/main">
+  <p:cSld>
+    <p:spTree>
+      <p:nvGrpSpPr>
+        <p:cNvPr id="1" name=""/>
+        <p:cNvGrpSpPr/>
+        <p:nvPr/>
+      </p:nvGrpSpPr>
+      <p:grpSpPr>
+        <a:xfrm>
+          <a:off x="0" y="0"/>
+          <a:ext cx="0" cy="0"/>
+          <a:chOff x="0" y="0"/>
+          <a:chExt cx="0" cy="0"/>
+        </a:xfrm>
+      </p:grpSpPr>
+      <p:sp>
+        <p:nvSpPr>
+          <p:cNvPr id="2" name="Titel 1">
+            <a:extLst>
+              <a:ext uri="{FF2B5EF4-FFF2-40B4-BE49-F238E27FC236}">
+                <a16:creationId xmlns:a16="http://schemas.microsoft.com/office/drawing/2014/main" id="{1D74E3FB-7B78-55C6-95E6-7F1729516DFF}"/>
+              </a:ext>
+            </a:extLst>
+          </p:cNvPr>
+          <p:cNvSpPr>
+            <a:spLocks noGrp="1"/>
+          </p:cNvSpPr>
+          <p:nvPr>
+            <p:ph type="title"/>
+          </p:nvPr>
+        </p:nvSpPr>
+        <p:spPr/>
+        <p:txBody>
+          <a:bodyPr/>
+          <a:lstStyle/>
+          <a:p>
+            <a:r>
+              <a:rPr lang="nl-NL"/>
+              <a:t>Principal Components Analysis (PCA)</a:t>
+            </a:r>
+          </a:p>
+        </p:txBody>
+      </p:sp>
+      <p:sp>
+        <p:nvSpPr>
+          <p:cNvPr id="3" name="Tijdelijke aanduiding voor inhoud 2">
+            <a:extLst>
+              <a:ext uri="{FF2B5EF4-FFF2-40B4-BE49-F238E27FC236}">
+                <a16:creationId xmlns:a16="http://schemas.microsoft.com/office/drawing/2014/main" id="{3BAF047F-66EE-3B83-F7F5-F4A335211357}"/>
+              </a:ext>
+            </a:extLst>
+          </p:cNvPr>
+          <p:cNvSpPr>
+            <a:spLocks noGrp="1"/>
+          </p:cNvSpPr>
+          <p:nvPr>
+            <p:ph idx="1"/>
+          </p:nvPr>
+        </p:nvSpPr>
+        <p:spPr>
+          <a:xfrm>
+            <a:off x="838200" y="1825625"/>
+            <a:ext cx="6885373" cy="4667250"/>
+          </a:xfrm>
+        </p:spPr>
+        <p:txBody>
+          <a:bodyPr>
+            <a:normAutofit lnSpcReduction="10000"/>
+          </a:bodyPr>
+          <a:lstStyle/>
+          <a:p>
+            <a:r>
+              <a:rPr lang="nl-NL"/>
+              <a:t>Ook bekend als Factoranalyse</a:t>
+            </a:r>
+          </a:p>
+          <a:p>
+            <a:r>
+              <a:rPr lang="nl-NL"/>
+              <a:t>Voorbeeld van </a:t>
+            </a:r>
+            <a:r>
+              <a:rPr lang="nl-NL" b="1"/>
+              <a:t>unsupervised</a:t>
+            </a:r>
+            <a:r>
+              <a:rPr lang="nl-NL"/>
+              <a:t> learning</a:t>
+            </a:r>
+          </a:p>
+          <a:p>
+            <a:pPr lvl="1"/>
+            <a:r>
+              <a:rPr lang="nl-NL"/>
+              <a:t>Net als Clustering</a:t>
+            </a:r>
+          </a:p>
+          <a:p>
+            <a:r>
+              <a:rPr lang="nl-NL"/>
+              <a:t>Transformatie van de oorspronkelijke data</a:t>
+            </a:r>
+          </a:p>
+          <a:p>
+            <a:r>
+              <a:rPr lang="nl-NL"/>
+              <a:t>Aantal features = aantal dimensies</a:t>
+            </a:r>
+          </a:p>
+          <a:p>
+            <a:r>
+              <a:rPr lang="nl-NL"/>
+              <a:t>In 2 dimensies vind je 2 PC’s</a:t>
+            </a:r>
+          </a:p>
+          <a:p>
+            <a:pPr lvl="1"/>
+            <a:r>
+              <a:rPr lang="nl-NL"/>
+              <a:t>De eerste lijkt op lineaire regressie</a:t>
+            </a:r>
+          </a:p>
+          <a:p>
+            <a:pPr lvl="1"/>
+            <a:r>
+              <a:rPr lang="nl-NL"/>
+              <a:t>De tweede staat er haaks op</a:t>
+            </a:r>
+          </a:p>
+          <a:p>
+            <a:r>
+              <a:rPr lang="nl-NL"/>
+              <a:t>Meer dimensies =&gt; meer PC’s</a:t>
+            </a:r>
+          </a:p>
+          <a:p>
+            <a:pPr lvl="1"/>
+            <a:r>
+              <a:rPr lang="nl-NL"/>
+              <a:t>Steeds haaks op het hyperplane van de vorige PC’s</a:t>
+            </a:r>
+          </a:p>
+        </p:txBody>
+      </p:sp>
+      <p:pic>
+        <p:nvPicPr>
+          <p:cNvPr id="1026" name="Picture 2">
+            <a:extLst>
+              <a:ext uri="{FF2B5EF4-FFF2-40B4-BE49-F238E27FC236}">
+                <a16:creationId xmlns:a16="http://schemas.microsoft.com/office/drawing/2014/main" id="{83590E51-C688-BDCA-8BEC-85340DCAFA3F}"/>
+              </a:ext>
+            </a:extLst>
+          </p:cNvPr>
+          <p:cNvPicPr>
+            <a:picLocks noChangeAspect="1" noChangeArrowheads="1"/>
+          </p:cNvPicPr>
+          <p:nvPr/>
+        </p:nvPicPr>
+        <p:blipFill>
+          <a:blip r:embed="rId2">
+            <a:extLst>
+              <a:ext uri="{28A0092B-C50C-407E-A947-70E740481C1C}">
+                <a14:useLocalDpi xmlns:a14="http://schemas.microsoft.com/office/drawing/2010/main" val="0"/>
+              </a:ext>
+            </a:extLst>
+          </a:blip>
+          <a:srcRect/>
+          <a:stretch>
+            <a:fillRect/>
+          </a:stretch>
+        </p:blipFill>
+        <p:spPr bwMode="auto">
+          <a:xfrm>
+            <a:off x="7900417" y="3120272"/>
+            <a:ext cx="4088734" cy="3191628"/>
+          </a:xfrm>
+          <a:prstGeom prst="rect">
+            <a:avLst/>
+          </a:prstGeom>
+          <a:noFill/>
+          <a:extLst>
+            <a:ext uri="{909E8E84-426E-40DD-AFC4-6F175D3DCCD1}">
+              <a14:hiddenFill xmlns:a14="http://schemas.microsoft.com/office/drawing/2010/main">
+                <a:solidFill>
+                  <a:srgbClr val="FFFFFF"/>
+                </a:solidFill>
+              </a14:hiddenFill>
+            </a:ext>
+          </a:extLst>
+        </p:spPr>
+      </p:pic>
+      <p:sp>
+        <p:nvSpPr>
+          <p:cNvPr id="4" name="Tekstvak 3">
+            <a:extLst>
+              <a:ext uri="{FF2B5EF4-FFF2-40B4-BE49-F238E27FC236}">
+                <a16:creationId xmlns:a16="http://schemas.microsoft.com/office/drawing/2014/main" id="{143CA62C-E5F8-B595-8B34-FC4F834A9C68}"/>
+              </a:ext>
+            </a:extLst>
+          </p:cNvPr>
+          <p:cNvSpPr txBox="1"/>
+          <p:nvPr/>
+        </p:nvSpPr>
+        <p:spPr>
+          <a:xfrm>
+            <a:off x="7989195" y="6311900"/>
+            <a:ext cx="4088734" cy="369332"/>
+          </a:xfrm>
+          <a:prstGeom prst="rect">
+            <a:avLst/>
+          </a:prstGeom>
+          <a:noFill/>
+        </p:spPr>
+        <p:txBody>
+          <a:bodyPr wrap="square" rtlCol="0">
+            <a:spAutoFit/>
+          </a:bodyPr>
+          <a:lstStyle/>
+          <a:p>
+            <a:r>
+              <a:rPr lang="nl-NL" i="1"/>
+              <a:t>Bron: researchgate.net</a:t>
+            </a:r>
+          </a:p>
+        </p:txBody>
+      </p:sp>
+    </p:spTree>
+    <p:extLst>
+      <p:ext uri="{BB962C8B-B14F-4D97-AF65-F5344CB8AC3E}">
+        <p14:creationId xmlns:p14="http://schemas.microsoft.com/office/powerpoint/2010/main" val="2179929126"/>
       </p:ext>
     </p:extLst>
   </p:cSld>
@@ -3720,6 +5209,20 @@
             <a:pPr lvl="1"/>
             <a:r>
               <a:rPr lang="nl-NL"/>
+              <a:t>Curse of Dimensionality</a:t>
+            </a:r>
+          </a:p>
+          <a:p>
+            <a:pPr lvl="1"/>
+            <a:r>
+              <a:rPr lang="nl-NL"/>
+              <a:t>Projectie en Manifold Learning</a:t>
+            </a:r>
+          </a:p>
+          <a:p>
+            <a:pPr lvl="1"/>
+            <a:r>
+              <a:rPr lang="nl-NL"/>
               <a:t>Principal Components Analysis (PCA)</a:t>
             </a:r>
           </a:p>
@@ -3729,6 +5232,871 @@
     <p:extLst>
       <p:ext uri="{BB962C8B-B14F-4D97-AF65-F5344CB8AC3E}">
         <p14:creationId xmlns:p14="http://schemas.microsoft.com/office/powerpoint/2010/main" val="2919839382"/>
+      </p:ext>
+    </p:extLst>
+  </p:cSld>
+  <p:clrMapOvr>
+    <a:masterClrMapping/>
+  </p:clrMapOvr>
+</p:sld>
+</file>
+
+<file path=ppt/slides/slide20.xml><?xml version="1.0" encoding="utf-8"?>
+<p:sld xmlns:a="http://schemas.openxmlformats.org/drawingml/2006/main" xmlns:r="http://schemas.openxmlformats.org/officeDocument/2006/relationships" xmlns:p="http://schemas.openxmlformats.org/presentationml/2006/main">
+  <p:cSld>
+    <p:spTree>
+      <p:nvGrpSpPr>
+        <p:cNvPr id="1" name=""/>
+        <p:cNvGrpSpPr/>
+        <p:nvPr/>
+      </p:nvGrpSpPr>
+      <p:grpSpPr>
+        <a:xfrm>
+          <a:off x="0" y="0"/>
+          <a:ext cx="0" cy="0"/>
+          <a:chOff x="0" y="0"/>
+          <a:chExt cx="0" cy="0"/>
+        </a:xfrm>
+      </p:grpSpPr>
+      <p:sp>
+        <p:nvSpPr>
+          <p:cNvPr id="2" name="Titel 1">
+            <a:extLst>
+              <a:ext uri="{FF2B5EF4-FFF2-40B4-BE49-F238E27FC236}">
+                <a16:creationId xmlns:a16="http://schemas.microsoft.com/office/drawing/2014/main" id="{16A32A46-5B22-2311-84EB-E2D2DA93EDE6}"/>
+              </a:ext>
+            </a:extLst>
+          </p:cNvPr>
+          <p:cNvSpPr>
+            <a:spLocks noGrp="1"/>
+          </p:cNvSpPr>
+          <p:nvPr>
+            <p:ph type="title"/>
+          </p:nvPr>
+        </p:nvSpPr>
+        <p:spPr/>
+        <p:txBody>
+          <a:bodyPr/>
+          <a:lstStyle/>
+          <a:p>
+            <a:r>
+              <a:rPr lang="nl-NL"/>
+              <a:t>Hoe zat het ook alweer: variantie</a:t>
+            </a:r>
+          </a:p>
+        </p:txBody>
+      </p:sp>
+      <mc:AlternateContent xmlns:mc="http://schemas.openxmlformats.org/markup-compatibility/2006">
+        <mc:Choice xmlns:a14="http://schemas.microsoft.com/office/drawing/2010/main" Requires="a14">
+          <p:sp>
+            <p:nvSpPr>
+              <p:cNvPr id="3" name="Tijdelijke aanduiding voor inhoud 2">
+                <a:extLst>
+                  <a:ext uri="{FF2B5EF4-FFF2-40B4-BE49-F238E27FC236}">
+                    <a16:creationId xmlns:a16="http://schemas.microsoft.com/office/drawing/2014/main" id="{8E2A2A65-74EE-DE63-8906-5CBAF820FFEF}"/>
+                  </a:ext>
+                </a:extLst>
+              </p:cNvPr>
+              <p:cNvSpPr>
+                <a:spLocks noGrp="1"/>
+              </p:cNvSpPr>
+              <p:nvPr>
+                <p:ph idx="1"/>
+              </p:nvPr>
+            </p:nvSpPr>
+            <p:spPr/>
+            <p:txBody>
+              <a:bodyPr/>
+              <a:lstStyle/>
+              <a:p>
+                <a14:m>
+                  <m:oMath xmlns:m="http://schemas.openxmlformats.org/officeDocument/2006/math">
+                    <m:sSup>
+                      <m:sSupPr>
+                        <m:ctrlPr>
+                          <a:rPr lang="nl-NL" i="1" smtClean="0">
+                            <a:latin typeface="Cambria Math" panose="02040503050406030204" pitchFamily="18" charset="0"/>
+                            <a:ea typeface="Cambria Math" panose="02040503050406030204" pitchFamily="18" charset="0"/>
+                          </a:rPr>
+                        </m:ctrlPr>
+                      </m:sSupPr>
+                      <m:e>
+                        <m:r>
+                          <a:rPr lang="nl-NL" i="1">
+                            <a:latin typeface="Cambria Math" panose="02040503050406030204" pitchFamily="18" charset="0"/>
+                            <a:ea typeface="Cambria Math" panose="02040503050406030204" pitchFamily="18" charset="0"/>
+                          </a:rPr>
+                          <m:t>𝜎</m:t>
+                        </m:r>
+                      </m:e>
+                      <m:sup>
+                        <m:r>
+                          <a:rPr lang="nl-NL" b="0" i="1" smtClean="0">
+                            <a:latin typeface="Cambria Math" panose="02040503050406030204" pitchFamily="18" charset="0"/>
+                            <a:ea typeface="Cambria Math" panose="02040503050406030204" pitchFamily="18" charset="0"/>
+                          </a:rPr>
+                          <m:t>2</m:t>
+                        </m:r>
+                      </m:sup>
+                    </m:sSup>
+                  </m:oMath>
+                </a14:m>
+                <a:r>
+                  <a:rPr lang="nl-NL"/>
+                  <a:t> = </a:t>
+                </a:r>
+                <a14:m>
+                  <m:oMath xmlns:m="http://schemas.openxmlformats.org/officeDocument/2006/math">
+                    <m:f>
+                      <m:fPr>
+                        <m:ctrlPr>
+                          <a:rPr lang="nl-NL" i="1" smtClean="0">
+                            <a:latin typeface="Cambria Math" panose="02040503050406030204" pitchFamily="18" charset="0"/>
+                          </a:rPr>
+                        </m:ctrlPr>
+                      </m:fPr>
+                      <m:num>
+                        <m:nary>
+                          <m:naryPr>
+                            <m:chr m:val="∑"/>
+                            <m:ctrlPr>
+                              <a:rPr lang="nl-NL" i="1" smtClean="0">
+                                <a:latin typeface="Cambria Math" panose="02040503050406030204" pitchFamily="18" charset="0"/>
+                              </a:rPr>
+                            </m:ctrlPr>
+                          </m:naryPr>
+                          <m:sub>
+                            <m:r>
+                              <m:rPr>
+                                <m:brk m:alnAt="23"/>
+                              </m:rPr>
+                              <a:rPr lang="nl-NL" b="0" i="1" smtClean="0">
+                                <a:latin typeface="Cambria Math" panose="02040503050406030204" pitchFamily="18" charset="0"/>
+                              </a:rPr>
+                              <m:t>𝑖</m:t>
+                            </m:r>
+                            <m:r>
+                              <a:rPr lang="nl-NL" b="0" i="1" smtClean="0">
+                                <a:latin typeface="Cambria Math" panose="02040503050406030204" pitchFamily="18" charset="0"/>
+                              </a:rPr>
+                              <m:t>=1</m:t>
+                            </m:r>
+                          </m:sub>
+                          <m:sup>
+                            <m:r>
+                              <a:rPr lang="nl-NL" b="0" i="1" smtClean="0">
+                                <a:latin typeface="Cambria Math" panose="02040503050406030204" pitchFamily="18" charset="0"/>
+                              </a:rPr>
+                              <m:t>𝑛</m:t>
+                            </m:r>
+                          </m:sup>
+                          <m:e>
+                            <m:sSup>
+                              <m:sSupPr>
+                                <m:ctrlPr>
+                                  <a:rPr lang="nl-NL" i="1" smtClean="0">
+                                    <a:latin typeface="Cambria Math" panose="02040503050406030204" pitchFamily="18" charset="0"/>
+                                    <a:ea typeface="Cambria Math" panose="02040503050406030204" pitchFamily="18" charset="0"/>
+                                  </a:rPr>
+                                </m:ctrlPr>
+                              </m:sSupPr>
+                              <m:e>
+                                <m:d>
+                                  <m:dPr>
+                                    <m:ctrlPr>
+                                      <a:rPr lang="nl-NL" i="1">
+                                        <a:latin typeface="Cambria Math" panose="02040503050406030204" pitchFamily="18" charset="0"/>
+                                      </a:rPr>
+                                    </m:ctrlPr>
+                                  </m:dPr>
+                                  <m:e>
+                                    <m:sSub>
+                                      <m:sSubPr>
+                                        <m:ctrlPr>
+                                          <a:rPr lang="nl-NL" i="1">
+                                            <a:latin typeface="Cambria Math" panose="02040503050406030204" pitchFamily="18" charset="0"/>
+                                          </a:rPr>
+                                        </m:ctrlPr>
+                                      </m:sSubPr>
+                                      <m:e>
+                                        <m:r>
+                                          <a:rPr lang="nl-NL" i="1">
+                                            <a:latin typeface="Cambria Math" panose="02040503050406030204" pitchFamily="18" charset="0"/>
+                                          </a:rPr>
+                                          <m:t>𝑥</m:t>
+                                        </m:r>
+                                      </m:e>
+                                      <m:sub>
+                                        <m:r>
+                                          <a:rPr lang="nl-NL" i="1">
+                                            <a:latin typeface="Cambria Math" panose="02040503050406030204" pitchFamily="18" charset="0"/>
+                                          </a:rPr>
+                                          <m:t>𝑖</m:t>
+                                        </m:r>
+                                      </m:sub>
+                                    </m:sSub>
+                                    <m:r>
+                                      <a:rPr lang="nl-NL" i="1">
+                                        <a:latin typeface="Cambria Math" panose="02040503050406030204" pitchFamily="18" charset="0"/>
+                                      </a:rPr>
+                                      <m:t> − </m:t>
+                                    </m:r>
+                                    <m:r>
+                                      <a:rPr lang="nl-NL" i="1">
+                                        <a:latin typeface="Cambria Math" panose="02040503050406030204" pitchFamily="18" charset="0"/>
+                                        <a:ea typeface="Cambria Math" panose="02040503050406030204" pitchFamily="18" charset="0"/>
+                                      </a:rPr>
+                                      <m:t>𝜇</m:t>
+                                    </m:r>
+                                  </m:e>
+                                </m:d>
+                              </m:e>
+                              <m:sup>
+                                <m:r>
+                                  <a:rPr lang="nl-NL" b="0" i="1" smtClean="0">
+                                    <a:latin typeface="Cambria Math" panose="02040503050406030204" pitchFamily="18" charset="0"/>
+                                    <a:ea typeface="Cambria Math" panose="02040503050406030204" pitchFamily="18" charset="0"/>
+                                  </a:rPr>
+                                  <m:t>2</m:t>
+                                </m:r>
+                              </m:sup>
+                            </m:sSup>
+                          </m:e>
+                        </m:nary>
+                      </m:num>
+                      <m:den>
+                        <m:r>
+                          <a:rPr lang="nl-NL" b="0" i="1" smtClean="0">
+                            <a:latin typeface="Cambria Math" panose="02040503050406030204" pitchFamily="18" charset="0"/>
+                          </a:rPr>
+                          <m:t>𝑛</m:t>
+                        </m:r>
+                      </m:den>
+                    </m:f>
+                  </m:oMath>
+                </a14:m>
+                <a:endParaRPr lang="nl-NL"/>
+              </a:p>
+              <a:p>
+                <a:r>
+                  <a:rPr lang="nl-NL"/>
+                  <a:t>Gemiddelde gekwadrateerde afwijking van het gemiddelde</a:t>
+                </a:r>
+              </a:p>
+              <a:p>
+                <a:r>
+                  <a:rPr lang="nl-NL"/>
+                  <a:t>Wortel van de variantie = standaarddeviatie</a:t>
+                </a:r>
+              </a:p>
+              <a:p>
+                <a:r>
+                  <a:rPr lang="nl-NL"/>
+                  <a:t>Zegt dus iets over de </a:t>
+                </a:r>
+                <a:r>
+                  <a:rPr lang="nl-NL" b="1"/>
+                  <a:t>spreiding</a:t>
+                </a:r>
+                <a:r>
+                  <a:rPr lang="nl-NL"/>
+                  <a:t> van de data</a:t>
+                </a:r>
+              </a:p>
+            </p:txBody>
+          </p:sp>
+        </mc:Choice>
+        <mc:Fallback>
+          <p:sp>
+            <p:nvSpPr>
+              <p:cNvPr id="3" name="Tijdelijke aanduiding voor inhoud 2">
+                <a:extLst>
+                  <a:ext uri="{FF2B5EF4-FFF2-40B4-BE49-F238E27FC236}">
+                    <a16:creationId xmlns:a16="http://schemas.microsoft.com/office/drawing/2014/main" id="{8E2A2A65-74EE-DE63-8906-5CBAF820FFEF}"/>
+                  </a:ext>
+                </a:extLst>
+              </p:cNvPr>
+              <p:cNvSpPr>
+                <a:spLocks noGrp="1" noRot="1" noChangeAspect="1" noMove="1" noResize="1" noEditPoints="1" noAdjustHandles="1" noChangeArrowheads="1" noChangeShapeType="1" noTextEdit="1"/>
+              </p:cNvSpPr>
+              <p:nvPr>
+                <p:ph idx="1"/>
+              </p:nvPr>
+            </p:nvSpPr>
+            <p:spPr>
+              <a:blipFill>
+                <a:blip r:embed="rId2"/>
+                <a:stretch>
+                  <a:fillRect l="-1043"/>
+                </a:stretch>
+              </a:blipFill>
+            </p:spPr>
+            <p:txBody>
+              <a:bodyPr/>
+              <a:lstStyle/>
+              <a:p>
+                <a:r>
+                  <a:rPr lang="nl-NL">
+                    <a:noFill/>
+                  </a:rPr>
+                  <a:t> </a:t>
+                </a:r>
+              </a:p>
+            </p:txBody>
+          </p:sp>
+        </mc:Fallback>
+      </mc:AlternateContent>
+    </p:spTree>
+    <p:extLst>
+      <p:ext uri="{BB962C8B-B14F-4D97-AF65-F5344CB8AC3E}">
+        <p14:creationId xmlns:p14="http://schemas.microsoft.com/office/powerpoint/2010/main" val="1513825078"/>
+      </p:ext>
+    </p:extLst>
+  </p:cSld>
+  <p:clrMapOvr>
+    <a:masterClrMapping/>
+  </p:clrMapOvr>
+</p:sld>
+</file>
+
+<file path=ppt/slides/slide21.xml><?xml version="1.0" encoding="utf-8"?>
+<p:sld xmlns:a="http://schemas.openxmlformats.org/drawingml/2006/main" xmlns:r="http://schemas.openxmlformats.org/officeDocument/2006/relationships" xmlns:p="http://schemas.openxmlformats.org/presentationml/2006/main">
+  <p:cSld>
+    <p:spTree>
+      <p:nvGrpSpPr>
+        <p:cNvPr id="1" name=""/>
+        <p:cNvGrpSpPr/>
+        <p:nvPr/>
+      </p:nvGrpSpPr>
+      <p:grpSpPr>
+        <a:xfrm>
+          <a:off x="0" y="0"/>
+          <a:ext cx="0" cy="0"/>
+          <a:chOff x="0" y="0"/>
+          <a:chExt cx="0" cy="0"/>
+        </a:xfrm>
+      </p:grpSpPr>
+      <p:sp>
+        <p:nvSpPr>
+          <p:cNvPr id="2" name="Titel 1">
+            <a:extLst>
+              <a:ext uri="{FF2B5EF4-FFF2-40B4-BE49-F238E27FC236}">
+                <a16:creationId xmlns:a16="http://schemas.microsoft.com/office/drawing/2014/main" id="{0F43E57A-133A-52D9-F994-C4612C07AAF4}"/>
+              </a:ext>
+            </a:extLst>
+          </p:cNvPr>
+          <p:cNvSpPr>
+            <a:spLocks noGrp="1"/>
+          </p:cNvSpPr>
+          <p:nvPr>
+            <p:ph type="title"/>
+          </p:nvPr>
+        </p:nvSpPr>
+        <p:spPr/>
+        <p:txBody>
+          <a:bodyPr/>
+          <a:lstStyle/>
+          <a:p>
+            <a:r>
+              <a:rPr lang="nl-NL"/>
+              <a:t>Wat is een Principal Component (PC)?</a:t>
+            </a:r>
+          </a:p>
+        </p:txBody>
+      </p:sp>
+      <p:sp>
+        <p:nvSpPr>
+          <p:cNvPr id="3" name="Tijdelijke aanduiding voor inhoud 2">
+            <a:extLst>
+              <a:ext uri="{FF2B5EF4-FFF2-40B4-BE49-F238E27FC236}">
+                <a16:creationId xmlns:a16="http://schemas.microsoft.com/office/drawing/2014/main" id="{19D66E79-CC00-EDCA-0D31-2F6F8B43F2CA}"/>
+              </a:ext>
+            </a:extLst>
+          </p:cNvPr>
+          <p:cNvSpPr>
+            <a:spLocks noGrp="1"/>
+          </p:cNvSpPr>
+          <p:nvPr>
+            <p:ph idx="1"/>
+          </p:nvPr>
+        </p:nvSpPr>
+        <p:spPr>
+          <a:xfrm>
+            <a:off x="838200" y="1825624"/>
+            <a:ext cx="6263936" cy="4486275"/>
+          </a:xfrm>
+        </p:spPr>
+        <p:txBody>
+          <a:bodyPr/>
+          <a:lstStyle/>
+          <a:p>
+            <a:r>
+              <a:rPr lang="nl-NL"/>
+              <a:t>Elke PC verklaart een percentage van de variantie van de data</a:t>
+            </a:r>
+          </a:p>
+          <a:p>
+            <a:pPr lvl="1"/>
+            <a:r>
+              <a:rPr lang="nl-NL"/>
+              <a:t>Keuze van de as zodanig dat dit % zo hoog mogelijk is</a:t>
+            </a:r>
+          </a:p>
+          <a:p>
+            <a:pPr lvl="1"/>
+            <a:r>
+              <a:rPr lang="nl-NL"/>
+              <a:t>Of: zo klein mogelijke MSD tussen data en projectie daarvan op de as</a:t>
+            </a:r>
+          </a:p>
+          <a:p>
+            <a:r>
+              <a:rPr lang="nl-NL"/>
+              <a:t>Elke PC is een </a:t>
+            </a:r>
+            <a:r>
+              <a:rPr lang="nl-NL" b="1"/>
+              <a:t>combinatie van features</a:t>
+            </a:r>
+          </a:p>
+          <a:p>
+            <a:pPr lvl="1"/>
+            <a:r>
+              <a:rPr lang="nl-NL"/>
+              <a:t>Voorbeeld:</a:t>
+            </a:r>
+          </a:p>
+          <a:p>
+            <a:pPr lvl="2"/>
+            <a:r>
+              <a:rPr lang="nl-NL"/>
+              <a:t>PC1 = 0.5 F1 + 0.2 F2</a:t>
+            </a:r>
+          </a:p>
+          <a:p>
+            <a:pPr lvl="2"/>
+            <a:r>
+              <a:rPr lang="nl-NL"/>
+              <a:t>PC2 = -0.2 F1 + 0.05 F2</a:t>
+            </a:r>
+          </a:p>
+        </p:txBody>
+      </p:sp>
+      <p:pic>
+        <p:nvPicPr>
+          <p:cNvPr id="4" name="Picture 2">
+            <a:extLst>
+              <a:ext uri="{FF2B5EF4-FFF2-40B4-BE49-F238E27FC236}">
+                <a16:creationId xmlns:a16="http://schemas.microsoft.com/office/drawing/2014/main" id="{8176640D-FF42-B82B-3AB2-0AAA7E5F4767}"/>
+              </a:ext>
+            </a:extLst>
+          </p:cNvPr>
+          <p:cNvPicPr>
+            <a:picLocks noChangeAspect="1" noChangeArrowheads="1"/>
+          </p:cNvPicPr>
+          <p:nvPr/>
+        </p:nvPicPr>
+        <p:blipFill>
+          <a:blip r:embed="rId2">
+            <a:extLst>
+              <a:ext uri="{28A0092B-C50C-407E-A947-70E740481C1C}">
+                <a14:useLocalDpi xmlns:a14="http://schemas.microsoft.com/office/drawing/2010/main" val="0"/>
+              </a:ext>
+            </a:extLst>
+          </a:blip>
+          <a:srcRect/>
+          <a:stretch>
+            <a:fillRect/>
+          </a:stretch>
+        </p:blipFill>
+        <p:spPr bwMode="auto">
+          <a:xfrm>
+            <a:off x="7394390" y="3120272"/>
+            <a:ext cx="4088734" cy="3191628"/>
+          </a:xfrm>
+          <a:prstGeom prst="rect">
+            <a:avLst/>
+          </a:prstGeom>
+          <a:noFill/>
+          <a:extLst>
+            <a:ext uri="{909E8E84-426E-40DD-AFC4-6F175D3DCCD1}">
+              <a14:hiddenFill xmlns:a14="http://schemas.microsoft.com/office/drawing/2010/main">
+                <a:solidFill>
+                  <a:srgbClr val="FFFFFF"/>
+                </a:solidFill>
+              </a14:hiddenFill>
+            </a:ext>
+          </a:extLst>
+        </p:spPr>
+      </p:pic>
+      <p:sp>
+        <p:nvSpPr>
+          <p:cNvPr id="5" name="Tekstvak 4">
+            <a:extLst>
+              <a:ext uri="{FF2B5EF4-FFF2-40B4-BE49-F238E27FC236}">
+                <a16:creationId xmlns:a16="http://schemas.microsoft.com/office/drawing/2014/main" id="{8C65714D-FA35-B5B6-D9B4-55CF3707CC67}"/>
+              </a:ext>
+            </a:extLst>
+          </p:cNvPr>
+          <p:cNvSpPr txBox="1"/>
+          <p:nvPr/>
+        </p:nvSpPr>
+        <p:spPr>
+          <a:xfrm>
+            <a:off x="7394390" y="6311900"/>
+            <a:ext cx="4088734" cy="369332"/>
+          </a:xfrm>
+          <a:prstGeom prst="rect">
+            <a:avLst/>
+          </a:prstGeom>
+          <a:noFill/>
+        </p:spPr>
+        <p:txBody>
+          <a:bodyPr wrap="square" rtlCol="0">
+            <a:spAutoFit/>
+          </a:bodyPr>
+          <a:lstStyle/>
+          <a:p>
+            <a:r>
+              <a:rPr lang="nl-NL" i="1"/>
+              <a:t>Bron: researchgate.net</a:t>
+            </a:r>
+          </a:p>
+        </p:txBody>
+      </p:sp>
+    </p:spTree>
+    <p:extLst>
+      <p:ext uri="{BB962C8B-B14F-4D97-AF65-F5344CB8AC3E}">
+        <p14:creationId xmlns:p14="http://schemas.microsoft.com/office/powerpoint/2010/main" val="3015982313"/>
+      </p:ext>
+    </p:extLst>
+  </p:cSld>
+  <p:clrMapOvr>
+    <a:masterClrMapping/>
+  </p:clrMapOvr>
+</p:sld>
+</file>
+
+<file path=ppt/slides/slide22.xml><?xml version="1.0" encoding="utf-8"?>
+<p:sld xmlns:a="http://schemas.openxmlformats.org/drawingml/2006/main" xmlns:r="http://schemas.openxmlformats.org/officeDocument/2006/relationships" xmlns:p="http://schemas.openxmlformats.org/presentationml/2006/main">
+  <p:cSld>
+    <p:spTree>
+      <p:nvGrpSpPr>
+        <p:cNvPr id="1" name=""/>
+        <p:cNvGrpSpPr/>
+        <p:nvPr/>
+      </p:nvGrpSpPr>
+      <p:grpSpPr>
+        <a:xfrm>
+          <a:off x="0" y="0"/>
+          <a:ext cx="0" cy="0"/>
+          <a:chOff x="0" y="0"/>
+          <a:chExt cx="0" cy="0"/>
+        </a:xfrm>
+      </p:grpSpPr>
+      <p:sp>
+        <p:nvSpPr>
+          <p:cNvPr id="2" name="Titel 1">
+            <a:extLst>
+              <a:ext uri="{FF2B5EF4-FFF2-40B4-BE49-F238E27FC236}">
+                <a16:creationId xmlns:a16="http://schemas.microsoft.com/office/drawing/2014/main" id="{9AFBE221-181A-9D52-568C-1DD37CACA852}"/>
+              </a:ext>
+            </a:extLst>
+          </p:cNvPr>
+          <p:cNvSpPr>
+            <a:spLocks noGrp="1"/>
+          </p:cNvSpPr>
+          <p:nvPr>
+            <p:ph type="title"/>
+          </p:nvPr>
+        </p:nvSpPr>
+        <p:spPr/>
+        <p:txBody>
+          <a:bodyPr/>
+          <a:lstStyle/>
+          <a:p>
+            <a:r>
+              <a:rPr lang="nl-NL"/>
+              <a:t>Toepassingen van PCA</a:t>
+            </a:r>
+          </a:p>
+        </p:txBody>
+      </p:sp>
+      <p:sp>
+        <p:nvSpPr>
+          <p:cNvPr id="3" name="Tijdelijke aanduiding voor inhoud 2">
+            <a:extLst>
+              <a:ext uri="{FF2B5EF4-FFF2-40B4-BE49-F238E27FC236}">
+                <a16:creationId xmlns:a16="http://schemas.microsoft.com/office/drawing/2014/main" id="{6D288973-1BF1-6205-84D2-6AA21C04A41F}"/>
+              </a:ext>
+            </a:extLst>
+          </p:cNvPr>
+          <p:cNvSpPr>
+            <a:spLocks noGrp="1"/>
+          </p:cNvSpPr>
+          <p:nvPr>
+            <p:ph idx="1"/>
+          </p:nvPr>
+        </p:nvSpPr>
+        <p:spPr>
+          <a:xfrm>
+            <a:off x="838200" y="1825625"/>
+            <a:ext cx="10515600" cy="1086251"/>
+          </a:xfrm>
+        </p:spPr>
+        <p:txBody>
+          <a:bodyPr/>
+          <a:lstStyle/>
+          <a:p>
+            <a:r>
+              <a:rPr lang="nl-NL"/>
+              <a:t>Dimensionaliteitsreductie</a:t>
+            </a:r>
+          </a:p>
+          <a:p>
+            <a:r>
+              <a:rPr lang="nl-NL"/>
+              <a:t>Compressie</a:t>
+            </a:r>
+          </a:p>
+        </p:txBody>
+      </p:sp>
+      <p:pic>
+        <p:nvPicPr>
+          <p:cNvPr id="6146" name="Picture 2">
+            <a:extLst>
+              <a:ext uri="{FF2B5EF4-FFF2-40B4-BE49-F238E27FC236}">
+                <a16:creationId xmlns:a16="http://schemas.microsoft.com/office/drawing/2014/main" id="{BC02A04D-71AF-3E4E-7A53-A522242C6E59}"/>
+              </a:ext>
+            </a:extLst>
+          </p:cNvPr>
+          <p:cNvPicPr>
+            <a:picLocks noChangeAspect="1" noChangeArrowheads="1"/>
+          </p:cNvPicPr>
+          <p:nvPr/>
+        </p:nvPicPr>
+        <p:blipFill>
+          <a:blip r:embed="rId2">
+            <a:extLst>
+              <a:ext uri="{28A0092B-C50C-407E-A947-70E740481C1C}">
+                <a14:useLocalDpi xmlns:a14="http://schemas.microsoft.com/office/drawing/2010/main" val="0"/>
+              </a:ext>
+            </a:extLst>
+          </a:blip>
+          <a:srcRect/>
+          <a:stretch>
+            <a:fillRect/>
+          </a:stretch>
+        </p:blipFill>
+        <p:spPr bwMode="auto">
+          <a:xfrm>
+            <a:off x="3361406" y="3202802"/>
+            <a:ext cx="5469187" cy="2913911"/>
+          </a:xfrm>
+          <a:prstGeom prst="rect">
+            <a:avLst/>
+          </a:prstGeom>
+          <a:noFill/>
+          <a:extLst>
+            <a:ext uri="{909E8E84-426E-40DD-AFC4-6F175D3DCCD1}">
+              <a14:hiddenFill xmlns:a14="http://schemas.microsoft.com/office/drawing/2010/main">
+                <a:solidFill>
+                  <a:srgbClr val="FFFFFF"/>
+                </a:solidFill>
+              </a14:hiddenFill>
+            </a:ext>
+          </a:extLst>
+        </p:spPr>
+      </p:pic>
+    </p:spTree>
+    <p:extLst>
+      <p:ext uri="{BB962C8B-B14F-4D97-AF65-F5344CB8AC3E}">
+        <p14:creationId xmlns:p14="http://schemas.microsoft.com/office/powerpoint/2010/main" val="11405208"/>
+      </p:ext>
+    </p:extLst>
+  </p:cSld>
+  <p:clrMapOvr>
+    <a:masterClrMapping/>
+  </p:clrMapOvr>
+</p:sld>
+</file>
+
+<file path=ppt/slides/slide23.xml><?xml version="1.0" encoding="utf-8"?>
+<p:sld xmlns:a="http://schemas.openxmlformats.org/drawingml/2006/main" xmlns:r="http://schemas.openxmlformats.org/officeDocument/2006/relationships" xmlns:p="http://schemas.openxmlformats.org/presentationml/2006/main">
+  <p:cSld>
+    <p:spTree>
+      <p:nvGrpSpPr>
+        <p:cNvPr id="1" name=""/>
+        <p:cNvGrpSpPr/>
+        <p:nvPr/>
+      </p:nvGrpSpPr>
+      <p:grpSpPr>
+        <a:xfrm>
+          <a:off x="0" y="0"/>
+          <a:ext cx="0" cy="0"/>
+          <a:chOff x="0" y="0"/>
+          <a:chExt cx="0" cy="0"/>
+        </a:xfrm>
+      </p:grpSpPr>
+      <p:sp>
+        <p:nvSpPr>
+          <p:cNvPr id="2" name="Titel 1">
+            <a:extLst>
+              <a:ext uri="{FF2B5EF4-FFF2-40B4-BE49-F238E27FC236}">
+                <a16:creationId xmlns:a16="http://schemas.microsoft.com/office/drawing/2014/main" id="{9ABC7D18-85A4-9BC0-4B53-2475FA87050A}"/>
+              </a:ext>
+            </a:extLst>
+          </p:cNvPr>
+          <p:cNvSpPr>
+            <a:spLocks noGrp="1"/>
+          </p:cNvSpPr>
+          <p:nvPr>
+            <p:ph type="title"/>
+          </p:nvPr>
+        </p:nvSpPr>
+        <p:spPr/>
+        <p:txBody>
+          <a:bodyPr/>
+          <a:lstStyle/>
+          <a:p>
+            <a:r>
+              <a:rPr lang="nl-NL"/>
+              <a:t>Afsluiting: live coding</a:t>
+            </a:r>
+          </a:p>
+        </p:txBody>
+      </p:sp>
+      <p:sp>
+        <p:nvSpPr>
+          <p:cNvPr id="3" name="Tijdelijke aanduiding voor inhoud 2">
+            <a:extLst>
+              <a:ext uri="{FF2B5EF4-FFF2-40B4-BE49-F238E27FC236}">
+                <a16:creationId xmlns:a16="http://schemas.microsoft.com/office/drawing/2014/main" id="{610C27AC-F2E4-2AB8-9E7F-010652D767C1}"/>
+              </a:ext>
+            </a:extLst>
+          </p:cNvPr>
+          <p:cNvSpPr>
+            <a:spLocks noGrp="1"/>
+          </p:cNvSpPr>
+          <p:nvPr>
+            <p:ph idx="1"/>
+          </p:nvPr>
+        </p:nvSpPr>
+        <p:spPr>
+          <a:xfrm>
+            <a:off x="838200" y="1825625"/>
+            <a:ext cx="10515600" cy="695633"/>
+          </a:xfrm>
+        </p:spPr>
+        <p:txBody>
+          <a:bodyPr/>
+          <a:lstStyle/>
+          <a:p>
+            <a:r>
+              <a:rPr lang="nl-NL"/>
+              <a:t>Notebook over PCA met scikit-learn</a:t>
+            </a:r>
+          </a:p>
+        </p:txBody>
+      </p:sp>
+      <p:pic>
+        <p:nvPicPr>
+          <p:cNvPr id="4" name="Picture 2" descr="Technology - Logos Download">
+            <a:extLst>
+              <a:ext uri="{FF2B5EF4-FFF2-40B4-BE49-F238E27FC236}">
+                <a16:creationId xmlns:a16="http://schemas.microsoft.com/office/drawing/2014/main" id="{A17E2F30-841E-4EBD-A1D6-4EC81B69103B}"/>
+              </a:ext>
+            </a:extLst>
+          </p:cNvPr>
+          <p:cNvPicPr>
+            <a:picLocks noChangeAspect="1" noChangeArrowheads="1"/>
+          </p:cNvPicPr>
+          <p:nvPr/>
+        </p:nvPicPr>
+        <p:blipFill>
+          <a:blip r:embed="rId2">
+            <a:extLst>
+              <a:ext uri="{28A0092B-C50C-407E-A947-70E740481C1C}">
+                <a14:useLocalDpi xmlns:a14="http://schemas.microsoft.com/office/drawing/2010/main" val="0"/>
+              </a:ext>
+            </a:extLst>
+          </a:blip>
+          <a:srcRect/>
+          <a:stretch>
+            <a:fillRect/>
+          </a:stretch>
+        </p:blipFill>
+        <p:spPr bwMode="auto">
+          <a:xfrm>
+            <a:off x="2682647" y="3429000"/>
+            <a:ext cx="1943986" cy="2277121"/>
+          </a:xfrm>
+          <a:prstGeom prst="rect">
+            <a:avLst/>
+          </a:prstGeom>
+          <a:noFill/>
+          <a:extLst>
+            <a:ext uri="{909E8E84-426E-40DD-AFC4-6F175D3DCCD1}">
+              <a14:hiddenFill xmlns:a14="http://schemas.microsoft.com/office/drawing/2010/main">
+                <a:solidFill>
+                  <a:srgbClr val="FFFFFF"/>
+                </a:solidFill>
+              </a14:hiddenFill>
+            </a:ext>
+          </a:extLst>
+        </p:spPr>
+      </p:pic>
+      <p:pic>
+        <p:nvPicPr>
+          <p:cNvPr id="7172" name="Picture 4" descr="Scikit-learn: librerie Python per il Machine Learning - Pulp Learning ...">
+            <a:extLst>
+              <a:ext uri="{FF2B5EF4-FFF2-40B4-BE49-F238E27FC236}">
+                <a16:creationId xmlns:a16="http://schemas.microsoft.com/office/drawing/2014/main" id="{E9A47997-767D-D737-F711-3C9E112029A5}"/>
+              </a:ext>
+            </a:extLst>
+          </p:cNvPr>
+          <p:cNvPicPr>
+            <a:picLocks noChangeAspect="1" noChangeArrowheads="1"/>
+          </p:cNvPicPr>
+          <p:nvPr/>
+        </p:nvPicPr>
+        <p:blipFill>
+          <a:blip r:embed="rId3">
+            <a:extLst>
+              <a:ext uri="{28A0092B-C50C-407E-A947-70E740481C1C}">
+                <a14:useLocalDpi xmlns:a14="http://schemas.microsoft.com/office/drawing/2010/main" val="0"/>
+              </a:ext>
+            </a:extLst>
+          </a:blip>
+          <a:srcRect/>
+          <a:stretch>
+            <a:fillRect/>
+          </a:stretch>
+        </p:blipFill>
+        <p:spPr bwMode="auto">
+          <a:xfrm>
+            <a:off x="5785281" y="3476186"/>
+            <a:ext cx="4230355" cy="2277121"/>
+          </a:xfrm>
+          <a:prstGeom prst="rect">
+            <a:avLst/>
+          </a:prstGeom>
+          <a:noFill/>
+          <a:extLst>
+            <a:ext uri="{909E8E84-426E-40DD-AFC4-6F175D3DCCD1}">
+              <a14:hiddenFill xmlns:a14="http://schemas.microsoft.com/office/drawing/2010/main">
+                <a:solidFill>
+                  <a:srgbClr val="FFFFFF"/>
+                </a:solidFill>
+              </a14:hiddenFill>
+            </a:ext>
+          </a:extLst>
+        </p:spPr>
+      </p:pic>
+    </p:spTree>
+    <p:extLst>
+      <p:ext uri="{BB962C8B-B14F-4D97-AF65-F5344CB8AC3E}">
+        <p14:creationId xmlns:p14="http://schemas.microsoft.com/office/powerpoint/2010/main" val="2578526049"/>
       </p:ext>
     </p:extLst>
   </p:cSld>
@@ -3760,7 +6128,7 @@
           <p:cNvPr id="2" name="Titel 1">
             <a:extLst>
               <a:ext uri="{FF2B5EF4-FFF2-40B4-BE49-F238E27FC236}">
-                <a16:creationId xmlns:a16="http://schemas.microsoft.com/office/drawing/2014/main" id="{836BB2F8-CAB2-80BC-FA5B-AA2BBBF03C11}"/>
+                <a16:creationId xmlns:a16="http://schemas.microsoft.com/office/drawing/2014/main" id="{96239233-6266-ACC4-FF67-BEFD799CD02D}"/>
               </a:ext>
             </a:extLst>
           </p:cNvPr>
@@ -3788,7 +6156,7 @@
           <p:cNvPr id="3" name="Tijdelijke aanduiding voor inhoud 2">
             <a:extLst>
               <a:ext uri="{FF2B5EF4-FFF2-40B4-BE49-F238E27FC236}">
-                <a16:creationId xmlns:a16="http://schemas.microsoft.com/office/drawing/2014/main" id="{9E5A7C92-CD05-D097-7156-88AFCAB2F7C1}"/>
+                <a16:creationId xmlns:a16="http://schemas.microsoft.com/office/drawing/2014/main" id="{E56F92E7-BF62-313D-462D-375DB8A79B44}"/>
               </a:ext>
             </a:extLst>
           </p:cNvPr>
@@ -3805,8 +6173,38 @@
           <a:lstStyle/>
           <a:p>
             <a:r>
-              <a:rPr lang="nl-NL"/>
-              <a:t>Denk terug aan de DBSCAN-opdracht</a:t>
+              <a:rPr lang="nl-NL" b="1"/>
+              <a:t>Hyper</a:t>
+            </a:r>
+            <a:r>
+              <a:rPr lang="nl-NL"/>
+              <a:t>parameters</a:t>
+            </a:r>
+          </a:p>
+          <a:p>
+            <a:pPr lvl="1"/>
+            <a:r>
+              <a:rPr lang="nl-NL"/>
+              <a:t>Parameters van het model, niet van de data</a:t>
+            </a:r>
+          </a:p>
+          <a:p>
+            <a:pPr lvl="1"/>
+            <a:r>
+              <a:rPr lang="nl-NL"/>
+              <a:t>Bijv. SVC: kernel, degree, C, gamma…</a:t>
+            </a:r>
+          </a:p>
+          <a:p>
+            <a:r>
+              <a:rPr lang="nl-NL"/>
+              <a:t>Vraag: welke combinatie van hyperparameters is de beste voor mijn ML-model?</a:t>
+            </a:r>
+          </a:p>
+          <a:p>
+            <a:r>
+              <a:rPr lang="nl-NL"/>
+              <a:t>Oplossing: gebruik ML!</a:t>
             </a:r>
           </a:p>
         </p:txBody>
@@ -3814,7 +6212,7 @@
     </p:spTree>
     <p:extLst>
       <p:ext uri="{BB962C8B-B14F-4D97-AF65-F5344CB8AC3E}">
-        <p14:creationId xmlns:p14="http://schemas.microsoft.com/office/powerpoint/2010/main" val="3761922381"/>
+        <p14:creationId xmlns:p14="http://schemas.microsoft.com/office/powerpoint/2010/main" val="1927753270"/>
       </p:ext>
     </p:extLst>
   </p:cSld>
@@ -3846,7 +6244,7 @@
           <p:cNvPr id="2" name="Titel 1">
             <a:extLst>
               <a:ext uri="{FF2B5EF4-FFF2-40B4-BE49-F238E27FC236}">
-                <a16:creationId xmlns:a16="http://schemas.microsoft.com/office/drawing/2014/main" id="{898840B0-D049-FBFD-830A-771A0B70EB21}"/>
+                <a16:creationId xmlns:a16="http://schemas.microsoft.com/office/drawing/2014/main" id="{836BB2F8-CAB2-80BC-FA5B-AA2BBBF03C11}"/>
               </a:ext>
             </a:extLst>
           </p:cNvPr>
@@ -3864,7 +6262,7 @@
           <a:p>
             <a:r>
               <a:rPr lang="nl-NL"/>
-              <a:t>GridSearchCV</a:t>
+              <a:t>Hyperparameter tuning</a:t>
             </a:r>
           </a:p>
         </p:txBody>
@@ -3874,7 +6272,7 @@
           <p:cNvPr id="3" name="Tijdelijke aanduiding voor inhoud 2">
             <a:extLst>
               <a:ext uri="{FF2B5EF4-FFF2-40B4-BE49-F238E27FC236}">
-                <a16:creationId xmlns:a16="http://schemas.microsoft.com/office/drawing/2014/main" id="{0439FC56-0C97-F011-33FC-1F21DA206BE0}"/>
+                <a16:creationId xmlns:a16="http://schemas.microsoft.com/office/drawing/2014/main" id="{9E5A7C92-CD05-D097-7156-88AFCAB2F7C1}"/>
               </a:ext>
             </a:extLst>
           </p:cNvPr>
@@ -3890,14 +6288,77 @@
           <a:bodyPr/>
           <a:lstStyle/>
           <a:p>
-            <a:endParaRPr lang="nl-NL"/>
-          </a:p>
-        </p:txBody>
-      </p:sp>
+            <a:r>
+              <a:rPr lang="nl-NL"/>
+              <a:t>Denk terug aan de DBSCAN-opdracht</a:t>
+            </a:r>
+          </a:p>
+        </p:txBody>
+      </p:sp>
+      <p:pic>
+        <p:nvPicPr>
+          <p:cNvPr id="5" name="Afbeelding 4">
+            <a:extLst>
+              <a:ext uri="{FF2B5EF4-FFF2-40B4-BE49-F238E27FC236}">
+                <a16:creationId xmlns:a16="http://schemas.microsoft.com/office/drawing/2014/main" id="{FEB7D387-A973-8E0F-A396-BD937A22E5CB}"/>
+              </a:ext>
+            </a:extLst>
+          </p:cNvPr>
+          <p:cNvPicPr>
+            <a:picLocks noChangeAspect="1"/>
+          </p:cNvPicPr>
+          <p:nvPr/>
+        </p:nvPicPr>
+        <p:blipFill>
+          <a:blip r:embed="rId2"/>
+          <a:stretch>
+            <a:fillRect/>
+          </a:stretch>
+        </p:blipFill>
+        <p:spPr>
+          <a:xfrm>
+            <a:off x="838200" y="3633433"/>
+            <a:ext cx="7773485" cy="2543530"/>
+          </a:xfrm>
+          <a:prstGeom prst="rect">
+            <a:avLst/>
+          </a:prstGeom>
+        </p:spPr>
+      </p:pic>
+      <p:pic>
+        <p:nvPicPr>
+          <p:cNvPr id="7" name="Afbeelding 6">
+            <a:extLst>
+              <a:ext uri="{FF2B5EF4-FFF2-40B4-BE49-F238E27FC236}">
+                <a16:creationId xmlns:a16="http://schemas.microsoft.com/office/drawing/2014/main" id="{A5128F08-2436-0910-3D81-42C7DB179943}"/>
+              </a:ext>
+            </a:extLst>
+          </p:cNvPr>
+          <p:cNvPicPr>
+            <a:picLocks noChangeAspect="1"/>
+          </p:cNvPicPr>
+          <p:nvPr/>
+        </p:nvPicPr>
+        <p:blipFill>
+          <a:blip r:embed="rId3"/>
+          <a:stretch>
+            <a:fillRect/>
+          </a:stretch>
+        </p:blipFill>
+        <p:spPr>
+          <a:xfrm>
+            <a:off x="838200" y="2719899"/>
+            <a:ext cx="3458058" cy="619211"/>
+          </a:xfrm>
+          <a:prstGeom prst="rect">
+            <a:avLst/>
+          </a:prstGeom>
+        </p:spPr>
+      </p:pic>
     </p:spTree>
     <p:extLst>
       <p:ext uri="{BB962C8B-B14F-4D97-AF65-F5344CB8AC3E}">
-        <p14:creationId xmlns:p14="http://schemas.microsoft.com/office/powerpoint/2010/main" val="1487951715"/>
+        <p14:creationId xmlns:p14="http://schemas.microsoft.com/office/powerpoint/2010/main" val="3761922381"/>
       </p:ext>
     </p:extLst>
   </p:cSld>
@@ -3929,7 +6390,7 @@
           <p:cNvPr id="2" name="Titel 1">
             <a:extLst>
               <a:ext uri="{FF2B5EF4-FFF2-40B4-BE49-F238E27FC236}">
-                <a16:creationId xmlns:a16="http://schemas.microsoft.com/office/drawing/2014/main" id="{3FE860AA-8902-86F3-120B-4D7D7F693E8D}"/>
+                <a16:creationId xmlns:a16="http://schemas.microsoft.com/office/drawing/2014/main" id="{3FFB3B84-ACF9-832C-0796-514FA2D0AB0E}"/>
               </a:ext>
             </a:extLst>
           </p:cNvPr>
@@ -3947,40 +6408,97 @@
           <a:p>
             <a:r>
               <a:rPr lang="nl-NL"/>
-              <a:t>RandomizedSearchCV</a:t>
-            </a:r>
-          </a:p>
-        </p:txBody>
-      </p:sp>
-      <p:sp>
-        <p:nvSpPr>
-          <p:cNvPr id="3" name="Tijdelijke aanduiding voor inhoud 2">
-            <a:extLst>
-              <a:ext uri="{FF2B5EF4-FFF2-40B4-BE49-F238E27FC236}">
-                <a16:creationId xmlns:a16="http://schemas.microsoft.com/office/drawing/2014/main" id="{E7633B9C-8941-26C5-BD39-C87C69E66656}"/>
-              </a:ext>
-            </a:extLst>
-          </p:cNvPr>
-          <p:cNvSpPr>
-            <a:spLocks noGrp="1"/>
-          </p:cNvSpPr>
-          <p:nvPr>
-            <p:ph idx="1"/>
-          </p:nvPr>
-        </p:nvSpPr>
-        <p:spPr/>
-        <p:txBody>
-          <a:bodyPr/>
-          <a:lstStyle/>
-          <a:p>
-            <a:endParaRPr lang="nl-NL"/>
+              <a:t>CV = Cross Validation</a:t>
+            </a:r>
+          </a:p>
+        </p:txBody>
+      </p:sp>
+      <p:pic>
+        <p:nvPicPr>
+          <p:cNvPr id="1026" name="Picture 2">
+            <a:extLst>
+              <a:ext uri="{FF2B5EF4-FFF2-40B4-BE49-F238E27FC236}">
+                <a16:creationId xmlns:a16="http://schemas.microsoft.com/office/drawing/2014/main" id="{BD5C95FF-57E8-336B-6716-2CCB7C3FC25B}"/>
+              </a:ext>
+            </a:extLst>
+          </p:cNvPr>
+          <p:cNvPicPr>
+            <a:picLocks noChangeAspect="1" noChangeArrowheads="1"/>
+          </p:cNvPicPr>
+          <p:nvPr/>
+        </p:nvPicPr>
+        <p:blipFill>
+          <a:blip r:embed="rId2">
+            <a:extLst>
+              <a:ext uri="{28A0092B-C50C-407E-A947-70E740481C1C}">
+                <a14:useLocalDpi xmlns:a14="http://schemas.microsoft.com/office/drawing/2010/main" val="0"/>
+              </a:ext>
+            </a:extLst>
+          </a:blip>
+          <a:srcRect/>
+          <a:stretch>
+            <a:fillRect/>
+          </a:stretch>
+        </p:blipFill>
+        <p:spPr bwMode="auto">
+          <a:xfrm>
+            <a:off x="838200" y="1906650"/>
+            <a:ext cx="8309415" cy="4571260"/>
+          </a:xfrm>
+          <a:prstGeom prst="rect">
+            <a:avLst/>
+          </a:prstGeom>
+          <a:noFill/>
+          <a:extLst>
+            <a:ext uri="{909E8E84-426E-40DD-AFC4-6F175D3DCCD1}">
+              <a14:hiddenFill xmlns:a14="http://schemas.microsoft.com/office/drawing/2010/main">
+                <a:solidFill>
+                  <a:srgbClr val="FFFFFF"/>
+                </a:solidFill>
+              </a14:hiddenFill>
+            </a:ext>
+          </a:extLst>
+        </p:spPr>
+      </p:pic>
+      <p:sp>
+        <p:nvSpPr>
+          <p:cNvPr id="4" name="Tekstvak 3">
+            <a:extLst>
+              <a:ext uri="{FF2B5EF4-FFF2-40B4-BE49-F238E27FC236}">
+                <a16:creationId xmlns:a16="http://schemas.microsoft.com/office/drawing/2014/main" id="{F641520D-50FC-BF3E-EAC6-65660E573FF7}"/>
+              </a:ext>
+            </a:extLst>
+          </p:cNvPr>
+          <p:cNvSpPr txBox="1"/>
+          <p:nvPr/>
+        </p:nvSpPr>
+        <p:spPr>
+          <a:xfrm>
+            <a:off x="9147615" y="6108578"/>
+            <a:ext cx="2610035" cy="369332"/>
+          </a:xfrm>
+          <a:prstGeom prst="rect">
+            <a:avLst/>
+          </a:prstGeom>
+          <a:noFill/>
+        </p:spPr>
+        <p:txBody>
+          <a:bodyPr wrap="square" rtlCol="0">
+            <a:spAutoFit/>
+          </a:bodyPr>
+          <a:lstStyle/>
+          <a:p>
+            <a:r>
+              <a:rPr lang="nl-NL" i="1"/>
+              <a:t>Bron: medium.com</a:t>
+            </a:r>
           </a:p>
         </p:txBody>
       </p:sp>
     </p:spTree>
     <p:extLst>
       <p:ext uri="{BB962C8B-B14F-4D97-AF65-F5344CB8AC3E}">
-        <p14:creationId xmlns:p14="http://schemas.microsoft.com/office/powerpoint/2010/main" val="2566703897"/>
+        <p14:creationId xmlns:p14="http://schemas.microsoft.com/office/powerpoint/2010/main" val="700508302"/>
       </p:ext>
     </p:extLst>
   </p:cSld>
@@ -4012,7 +6530,7 @@
           <p:cNvPr id="2" name="Titel 1">
             <a:extLst>
               <a:ext uri="{FF2B5EF4-FFF2-40B4-BE49-F238E27FC236}">
-                <a16:creationId xmlns:a16="http://schemas.microsoft.com/office/drawing/2014/main" id="{45722B26-A584-039F-4101-5FA1FF367A7E}"/>
+                <a16:creationId xmlns:a16="http://schemas.microsoft.com/office/drawing/2014/main" id="{898840B0-D049-FBFD-830A-771A0B70EB21}"/>
               </a:ext>
             </a:extLst>
           </p:cNvPr>
@@ -4030,7 +6548,7 @@
           <a:p>
             <a:r>
               <a:rPr lang="nl-NL"/>
-              <a:t>Halving</a:t>
+              <a:t>GridSearchCV</a:t>
             </a:r>
           </a:p>
         </p:txBody>
@@ -4040,7 +6558,7 @@
           <p:cNvPr id="3" name="Tijdelijke aanduiding voor inhoud 2">
             <a:extLst>
               <a:ext uri="{FF2B5EF4-FFF2-40B4-BE49-F238E27FC236}">
-                <a16:creationId xmlns:a16="http://schemas.microsoft.com/office/drawing/2014/main" id="{1FA549B8-2056-C987-D229-C7DF8D1ACE5C}"/>
+                <a16:creationId xmlns:a16="http://schemas.microsoft.com/office/drawing/2014/main" id="{0439FC56-0C97-F011-33FC-1F21DA206BE0}"/>
               </a:ext>
             </a:extLst>
           </p:cNvPr>
@@ -4056,14 +6574,67 @@
           <a:bodyPr/>
           <a:lstStyle/>
           <a:p>
-            <a:endParaRPr lang="nl-NL"/>
+            <a:r>
+              <a:rPr lang="nl-NL"/>
+              <a:t>Probeert alle combinaties van de opgegeven parameters uit</a:t>
+            </a:r>
+          </a:p>
+          <a:p>
+            <a:pPr lvl="1"/>
+            <a:r>
+              <a:rPr lang="nl-NL"/>
+              <a:t>param_grid</a:t>
+            </a:r>
+          </a:p>
+          <a:p>
+            <a:r>
+              <a:rPr lang="nl-NL"/>
+              <a:t>Per combinatie Cross Validation met </a:t>
+            </a:r>
+            <a:r>
+              <a:rPr lang="nl-NL" i="1"/>
+              <a:t>cv</a:t>
+            </a:r>
+            <a:r>
+              <a:rPr lang="nl-NL"/>
+              <a:t> folds</a:t>
+            </a:r>
+          </a:p>
+          <a:p>
+            <a:r>
+              <a:rPr lang="nl-NL"/>
+              <a:t>Kan erg lang bezig zijn</a:t>
+            </a:r>
+          </a:p>
+          <a:p>
+            <a:pPr lvl="1"/>
+            <a:r>
+              <a:rPr lang="nl-NL"/>
+              <a:t>Toevoegen van een parameter met </a:t>
+            </a:r>
+            <a:r>
+              <a:rPr lang="nl-NL" i="1"/>
+              <a:t>n</a:t>
+            </a:r>
+            <a:r>
+              <a:rPr lang="nl-NL"/>
+              <a:t> waardes maakt doorlooptijd </a:t>
+            </a:r>
+            <a:r>
+              <a:rPr lang="nl-NL" i="1"/>
+              <a:t>n</a:t>
+            </a:r>
+            <a:r>
+              <a:rPr lang="nl-NL"/>
+              <a:t> x langer</a:t>
+            </a:r>
           </a:p>
         </p:txBody>
       </p:sp>
     </p:spTree>
     <p:extLst>
       <p:ext uri="{BB962C8B-B14F-4D97-AF65-F5344CB8AC3E}">
-        <p14:creationId xmlns:p14="http://schemas.microsoft.com/office/powerpoint/2010/main" val="3441588839"/>
+        <p14:creationId xmlns:p14="http://schemas.microsoft.com/office/powerpoint/2010/main" val="1487951715"/>
       </p:ext>
     </p:extLst>
   </p:cSld>
@@ -4095,7 +6666,7 @@
           <p:cNvPr id="2" name="Titel 1">
             <a:extLst>
               <a:ext uri="{FF2B5EF4-FFF2-40B4-BE49-F238E27FC236}">
-                <a16:creationId xmlns:a16="http://schemas.microsoft.com/office/drawing/2014/main" id="{13E9BECA-5360-E53A-5C51-FF4BA7D9E8A2}"/>
+                <a16:creationId xmlns:a16="http://schemas.microsoft.com/office/drawing/2014/main" id="{76A6A133-4522-616C-F4D2-75E90D2C127A}"/>
               </a:ext>
             </a:extLst>
           </p:cNvPr>
@@ -4113,7 +6684,7 @@
           <a:p>
             <a:r>
               <a:rPr lang="nl-NL"/>
-              <a:t>Curse of Dimensionality</a:t>
+              <a:t>GridSearchCV in code</a:t>
             </a:r>
           </a:p>
         </p:txBody>
@@ -4123,7 +6694,7 @@
           <p:cNvPr id="3" name="Tijdelijke aanduiding voor inhoud 2">
             <a:extLst>
               <a:ext uri="{FF2B5EF4-FFF2-40B4-BE49-F238E27FC236}">
-                <a16:creationId xmlns:a16="http://schemas.microsoft.com/office/drawing/2014/main" id="{2A8132DF-23B2-2304-E396-B660D0CB0F9F}"/>
+                <a16:creationId xmlns:a16="http://schemas.microsoft.com/office/drawing/2014/main" id="{51F1E47C-1425-90D2-2565-AC91A6B9F31B}"/>
               </a:ext>
             </a:extLst>
           </p:cNvPr>
@@ -4134,11 +6705,232 @@
             <p:ph idx="1"/>
           </p:nvPr>
         </p:nvSpPr>
-        <p:spPr/>
-        <p:txBody>
-          <a:bodyPr/>
-          <a:lstStyle/>
-          <a:p>
+        <p:spPr>
+          <a:xfrm>
+            <a:off x="838200" y="3756009"/>
+            <a:ext cx="10515600" cy="2747963"/>
+          </a:xfrm>
+        </p:spPr>
+        <p:txBody>
+          <a:bodyPr/>
+          <a:lstStyle/>
+          <a:p>
+            <a:r>
+              <a:rPr lang="nl-NL"/>
+              <a:t>Na het fitten zijn o.a. op te vragen:</a:t>
+            </a:r>
+          </a:p>
+          <a:p>
+            <a:pPr lvl="1"/>
+            <a:r>
+              <a:rPr lang="nl-NL"/>
+              <a:t>cv_results_</a:t>
+            </a:r>
+          </a:p>
+          <a:p>
+            <a:pPr lvl="1"/>
+            <a:r>
+              <a:rPr lang="nl-NL"/>
+              <a:t>best_score_</a:t>
+            </a:r>
+          </a:p>
+          <a:p>
+            <a:pPr lvl="1"/>
+            <a:r>
+              <a:rPr lang="nl-NL"/>
+              <a:t>best_params_</a:t>
+            </a:r>
+          </a:p>
+          <a:p>
+            <a:r>
+              <a:rPr lang="nl-NL"/>
+              <a:t>Voorbeeld in Notebook</a:t>
+            </a:r>
+          </a:p>
+        </p:txBody>
+      </p:sp>
+      <p:pic>
+        <p:nvPicPr>
+          <p:cNvPr id="5" name="Afbeelding 4">
+            <a:extLst>
+              <a:ext uri="{FF2B5EF4-FFF2-40B4-BE49-F238E27FC236}">
+                <a16:creationId xmlns:a16="http://schemas.microsoft.com/office/drawing/2014/main" id="{9C0F1219-87BD-EF24-518C-42B8C0805AAE}"/>
+              </a:ext>
+            </a:extLst>
+          </p:cNvPr>
+          <p:cNvPicPr>
+            <a:picLocks noChangeAspect="1"/>
+          </p:cNvPicPr>
+          <p:nvPr/>
+        </p:nvPicPr>
+        <p:blipFill>
+          <a:blip r:embed="rId2"/>
+          <a:stretch>
+            <a:fillRect/>
+          </a:stretch>
+        </p:blipFill>
+        <p:spPr>
+          <a:xfrm>
+            <a:off x="360056" y="1690688"/>
+            <a:ext cx="11241069" cy="1638529"/>
+          </a:xfrm>
+          <a:prstGeom prst="rect">
+            <a:avLst/>
+          </a:prstGeom>
+        </p:spPr>
+      </p:pic>
+      <p:sp>
+        <p:nvSpPr>
+          <p:cNvPr id="6" name="Ovaal 5">
+            <a:extLst>
+              <a:ext uri="{FF2B5EF4-FFF2-40B4-BE49-F238E27FC236}">
+                <a16:creationId xmlns:a16="http://schemas.microsoft.com/office/drawing/2014/main" id="{F135CB59-A087-49C9-D5B3-1569A81979C0}"/>
+              </a:ext>
+            </a:extLst>
+          </p:cNvPr>
+          <p:cNvSpPr/>
+          <p:nvPr/>
+        </p:nvSpPr>
+        <p:spPr>
+          <a:xfrm>
+            <a:off x="4696287" y="2583402"/>
+            <a:ext cx="2041864" cy="432849"/>
+          </a:xfrm>
+          <a:prstGeom prst="ellipse">
+            <a:avLst/>
+          </a:prstGeom>
+          <a:noFill/>
+          <a:ln w="28575">
+            <a:solidFill>
+              <a:srgbClr val="FF0000"/>
+            </a:solidFill>
+          </a:ln>
+        </p:spPr>
+        <p:style>
+          <a:lnRef idx="2">
+            <a:schemeClr val="accent1">
+              <a:shade val="15000"/>
+            </a:schemeClr>
+          </a:lnRef>
+          <a:fillRef idx="1">
+            <a:schemeClr val="accent1"/>
+          </a:fillRef>
+          <a:effectRef idx="0">
+            <a:schemeClr val="accent1"/>
+          </a:effectRef>
+          <a:fontRef idx="minor">
+            <a:schemeClr val="lt1"/>
+          </a:fontRef>
+        </p:style>
+        <p:txBody>
+          <a:bodyPr rtlCol="0" anchor="ctr"/>
+          <a:lstStyle/>
+          <a:p>
+            <a:pPr algn="ctr"/>
+            <a:endParaRPr lang="nl-NL"/>
+          </a:p>
+        </p:txBody>
+      </p:sp>
+      <p:sp>
+        <p:nvSpPr>
+          <p:cNvPr id="7" name="Ovaal 6">
+            <a:extLst>
+              <a:ext uri="{FF2B5EF4-FFF2-40B4-BE49-F238E27FC236}">
+                <a16:creationId xmlns:a16="http://schemas.microsoft.com/office/drawing/2014/main" id="{39C9CDE6-499B-0659-3F8D-3D78688A7419}"/>
+              </a:ext>
+            </a:extLst>
+          </p:cNvPr>
+          <p:cNvSpPr/>
+          <p:nvPr/>
+        </p:nvSpPr>
+        <p:spPr>
+          <a:xfrm>
+            <a:off x="10147177" y="2583402"/>
+            <a:ext cx="1012054" cy="432849"/>
+          </a:xfrm>
+          <a:prstGeom prst="ellipse">
+            <a:avLst/>
+          </a:prstGeom>
+          <a:noFill/>
+          <a:ln w="28575">
+            <a:solidFill>
+              <a:srgbClr val="FF0000"/>
+            </a:solidFill>
+          </a:ln>
+        </p:spPr>
+        <p:style>
+          <a:lnRef idx="2">
+            <a:schemeClr val="accent1">
+              <a:shade val="15000"/>
+            </a:schemeClr>
+          </a:lnRef>
+          <a:fillRef idx="1">
+            <a:schemeClr val="accent1"/>
+          </a:fillRef>
+          <a:effectRef idx="0">
+            <a:schemeClr val="accent1"/>
+          </a:effectRef>
+          <a:fontRef idx="minor">
+            <a:schemeClr val="lt1"/>
+          </a:fontRef>
+        </p:style>
+        <p:txBody>
+          <a:bodyPr rtlCol="0" anchor="ctr"/>
+          <a:lstStyle/>
+          <a:p>
+            <a:pPr algn="ctr"/>
+            <a:endParaRPr lang="nl-NL"/>
+          </a:p>
+        </p:txBody>
+      </p:sp>
+      <p:sp>
+        <p:nvSpPr>
+          <p:cNvPr id="8" name="Ovaal 7">
+            <a:extLst>
+              <a:ext uri="{FF2B5EF4-FFF2-40B4-BE49-F238E27FC236}">
+                <a16:creationId xmlns:a16="http://schemas.microsoft.com/office/drawing/2014/main" id="{880E9701-2A76-918E-A777-33A620D65757}"/>
+              </a:ext>
+            </a:extLst>
+          </p:cNvPr>
+          <p:cNvSpPr/>
+          <p:nvPr/>
+        </p:nvSpPr>
+        <p:spPr>
+          <a:xfrm>
+            <a:off x="426128" y="2893340"/>
+            <a:ext cx="1091954" cy="432849"/>
+          </a:xfrm>
+          <a:prstGeom prst="ellipse">
+            <a:avLst/>
+          </a:prstGeom>
+          <a:noFill/>
+          <a:ln w="28575">
+            <a:solidFill>
+              <a:srgbClr val="FF0000"/>
+            </a:solidFill>
+          </a:ln>
+        </p:spPr>
+        <p:style>
+          <a:lnRef idx="2">
+            <a:schemeClr val="accent1">
+              <a:shade val="15000"/>
+            </a:schemeClr>
+          </a:lnRef>
+          <a:fillRef idx="1">
+            <a:schemeClr val="accent1"/>
+          </a:fillRef>
+          <a:effectRef idx="0">
+            <a:schemeClr val="accent1"/>
+          </a:effectRef>
+          <a:fontRef idx="minor">
+            <a:schemeClr val="lt1"/>
+          </a:fontRef>
+        </p:style>
+        <p:txBody>
+          <a:bodyPr rtlCol="0" anchor="ctr"/>
+          <a:lstStyle/>
+          <a:p>
+            <a:pPr algn="ctr"/>
             <a:endParaRPr lang="nl-NL"/>
           </a:p>
         </p:txBody>
@@ -4146,7 +6938,7 @@
     </p:spTree>
     <p:extLst>
       <p:ext uri="{BB962C8B-B14F-4D97-AF65-F5344CB8AC3E}">
-        <p14:creationId xmlns:p14="http://schemas.microsoft.com/office/powerpoint/2010/main" val="3928319084"/>
+        <p14:creationId xmlns:p14="http://schemas.microsoft.com/office/powerpoint/2010/main" val="1215871647"/>
       </p:ext>
     </p:extLst>
   </p:cSld>
@@ -4178,7 +6970,7 @@
           <p:cNvPr id="2" name="Titel 1">
             <a:extLst>
               <a:ext uri="{FF2B5EF4-FFF2-40B4-BE49-F238E27FC236}">
-                <a16:creationId xmlns:a16="http://schemas.microsoft.com/office/drawing/2014/main" id="{5897A41E-F22D-AB5F-DEE3-284EDFDAC696}"/>
+                <a16:creationId xmlns:a16="http://schemas.microsoft.com/office/drawing/2014/main" id="{3FE860AA-8902-86F3-120B-4D7D7F693E8D}"/>
               </a:ext>
             </a:extLst>
           </p:cNvPr>
@@ -4196,7 +6988,7 @@
           <a:p>
             <a:r>
               <a:rPr lang="nl-NL"/>
-              <a:t>Dimensionaliteitsreductie</a:t>
+              <a:t>RandomizedSearchCV</a:t>
             </a:r>
           </a:p>
         </p:txBody>
@@ -4206,7 +6998,7 @@
           <p:cNvPr id="3" name="Tijdelijke aanduiding voor inhoud 2">
             <a:extLst>
               <a:ext uri="{FF2B5EF4-FFF2-40B4-BE49-F238E27FC236}">
-                <a16:creationId xmlns:a16="http://schemas.microsoft.com/office/drawing/2014/main" id="{9905F51F-A9F8-341B-F521-B1150F2606DD}"/>
+                <a16:creationId xmlns:a16="http://schemas.microsoft.com/office/drawing/2014/main" id="{E7633B9C-8941-26C5-BD39-C87C69E66656}"/>
               </a:ext>
             </a:extLst>
           </p:cNvPr>
@@ -4222,14 +7014,71 @@
           <a:bodyPr/>
           <a:lstStyle/>
           <a:p>
-            <a:endParaRPr lang="nl-NL"/>
+            <a:r>
+              <a:rPr lang="nl-NL"/>
+              <a:t>Performt veel beter dan GridSearchCV</a:t>
+            </a:r>
+          </a:p>
+          <a:p>
+            <a:pPr lvl="1"/>
+            <a:r>
+              <a:rPr lang="nl-NL"/>
+              <a:t>Toevoegen van parameters maakt niet uit voor de doorlooptijd</a:t>
+            </a:r>
+          </a:p>
+          <a:p>
+            <a:r>
+              <a:rPr lang="nl-NL"/>
+              <a:t>Werkt soms zelfs beter dan GridSearchCV</a:t>
+            </a:r>
+          </a:p>
+          <a:p>
+            <a:pPr lvl="1"/>
+            <a:r>
+              <a:rPr lang="nl-NL"/>
+              <a:t>Van continue variabelen kan hiermee elke waarde aan bod komen</a:t>
+            </a:r>
+          </a:p>
+          <a:p>
+            <a:r>
+              <a:rPr lang="nl-NL"/>
+              <a:t>Parameter </a:t>
+            </a:r>
+            <a:r>
+              <a:rPr lang="nl-NL" i="1"/>
+              <a:t>n_iter </a:t>
+            </a:r>
+            <a:r>
+              <a:rPr lang="nl-NL"/>
+              <a:t>bepaalt hoeveel iteraties je wilt doen</a:t>
+            </a:r>
+          </a:p>
+          <a:p>
+            <a:r>
+              <a:rPr lang="nl-NL"/>
+              <a:t>In elke iteratie wordt een random combinatie geprobeerd</a:t>
+            </a:r>
+          </a:p>
+          <a:p>
+            <a:r>
+              <a:rPr lang="nl-NL" i="1"/>
+              <a:t>param_grid </a:t>
+            </a:r>
+            <a:r>
+              <a:rPr lang="nl-NL"/>
+              <a:t>=&gt; </a:t>
+            </a:r>
+            <a:r>
+              <a:rPr lang="nl-NL" b="1" i="1"/>
+              <a:t>param_distributions</a:t>
+            </a:r>
           </a:p>
         </p:txBody>
       </p:sp>
     </p:spTree>
     <p:extLst>
       <p:ext uri="{BB962C8B-B14F-4D97-AF65-F5344CB8AC3E}">
-        <p14:creationId xmlns:p14="http://schemas.microsoft.com/office/powerpoint/2010/main" val="4092464840"/>
+        <p14:creationId xmlns:p14="http://schemas.microsoft.com/office/powerpoint/2010/main" val="2566703897"/>
       </p:ext>
     </p:extLst>
   </p:cSld>
@@ -4261,7 +7110,7 @@
           <p:cNvPr id="2" name="Titel 1">
             <a:extLst>
               <a:ext uri="{FF2B5EF4-FFF2-40B4-BE49-F238E27FC236}">
-                <a16:creationId xmlns:a16="http://schemas.microsoft.com/office/drawing/2014/main" id="{1D74E3FB-7B78-55C6-95E6-7F1729516DFF}"/>
+                <a16:creationId xmlns:a16="http://schemas.microsoft.com/office/drawing/2014/main" id="{120A2CC3-C13D-E93D-1C30-0611F416CCE7}"/>
               </a:ext>
             </a:extLst>
           </p:cNvPr>
@@ -4279,7 +7128,7 @@
           <a:p>
             <a:r>
               <a:rPr lang="nl-NL"/>
-              <a:t>Principal Components Analysis (PCA)</a:t>
+              <a:t>RandomizedSearchCV in code</a:t>
             </a:r>
           </a:p>
         </p:txBody>
@@ -4289,7 +7138,7 @@
           <p:cNvPr id="3" name="Tijdelijke aanduiding voor inhoud 2">
             <a:extLst>
               <a:ext uri="{FF2B5EF4-FFF2-40B4-BE49-F238E27FC236}">
-                <a16:creationId xmlns:a16="http://schemas.microsoft.com/office/drawing/2014/main" id="{3BAF047F-66EE-3B83-F7F5-F4A335211357}"/>
+                <a16:creationId xmlns:a16="http://schemas.microsoft.com/office/drawing/2014/main" id="{E8A6B666-BD5D-DC7F-BA8A-3B899B2CB73B}"/>
               </a:ext>
             </a:extLst>
           </p:cNvPr>
@@ -4300,131 +7149,243 @@
             <p:ph idx="1"/>
           </p:nvPr>
         </p:nvSpPr>
-        <p:spPr/>
-        <p:txBody>
-          <a:bodyPr/>
-          <a:lstStyle/>
-          <a:p>
-            <a:r>
-              <a:rPr lang="nl-NL"/>
-              <a:t>Ook bekend als Factoranalyse</a:t>
-            </a:r>
-          </a:p>
-          <a:p>
-            <a:r>
-              <a:rPr lang="nl-NL"/>
-              <a:t>Voorbeeld van </a:t>
-            </a:r>
-            <a:r>
-              <a:rPr lang="nl-NL" b="1"/>
-              <a:t>unsupervised</a:t>
-            </a:r>
-            <a:r>
-              <a:rPr lang="nl-NL"/>
-              <a:t> learning</a:t>
+        <p:spPr>
+          <a:xfrm>
+            <a:off x="838200" y="3879542"/>
+            <a:ext cx="10515600" cy="2297420"/>
+          </a:xfrm>
+        </p:spPr>
+        <p:txBody>
+          <a:bodyPr/>
+          <a:lstStyle/>
+          <a:p>
+            <a:r>
+              <a:rPr lang="nl-NL"/>
+              <a:t>Na het fitten zijn o.a. op te vragen:</a:t>
             </a:r>
           </a:p>
           <a:p>
             <a:pPr lvl="1"/>
             <a:r>
               <a:rPr lang="nl-NL"/>
-              <a:t>Net als Clustering</a:t>
-            </a:r>
-          </a:p>
-          <a:p>
-            <a:r>
-              <a:rPr lang="nl-NL"/>
-              <a:t>Transformatie van de oospronkelijke data</a:t>
-            </a:r>
+              <a:t>cv_results_</a:t>
+            </a:r>
+          </a:p>
+          <a:p>
+            <a:pPr lvl="1"/>
+            <a:r>
+              <a:rPr lang="nl-NL"/>
+              <a:t>best_score_</a:t>
+            </a:r>
+          </a:p>
+          <a:p>
+            <a:pPr lvl="1"/>
+            <a:r>
+              <a:rPr lang="nl-NL"/>
+              <a:t>best_params_</a:t>
+            </a:r>
+          </a:p>
+          <a:p>
+            <a:r>
+              <a:rPr lang="nl-NL"/>
+              <a:t>Voorbeeld in Notebook</a:t>
+            </a:r>
+          </a:p>
+          <a:p>
+            <a:endParaRPr lang="nl-NL"/>
           </a:p>
         </p:txBody>
       </p:sp>
       <p:pic>
         <p:nvPicPr>
-          <p:cNvPr id="1026" name="Picture 2">
-            <a:extLst>
-              <a:ext uri="{FF2B5EF4-FFF2-40B4-BE49-F238E27FC236}">
-                <a16:creationId xmlns:a16="http://schemas.microsoft.com/office/drawing/2014/main" id="{83590E51-C688-BDCA-8BEC-85340DCAFA3F}"/>
+          <p:cNvPr id="5" name="Afbeelding 4">
+            <a:extLst>
+              <a:ext uri="{FF2B5EF4-FFF2-40B4-BE49-F238E27FC236}">
+                <a16:creationId xmlns:a16="http://schemas.microsoft.com/office/drawing/2014/main" id="{EE57FD6F-5F44-2BE3-D37D-36C376B8E42B}"/>
               </a:ext>
             </a:extLst>
           </p:cNvPr>
           <p:cNvPicPr>
-            <a:picLocks noChangeAspect="1" noChangeArrowheads="1"/>
+            <a:picLocks noChangeAspect="1"/>
           </p:cNvPicPr>
           <p:nvPr/>
         </p:nvPicPr>
         <p:blipFill>
-          <a:blip r:embed="rId2">
-            <a:extLst>
-              <a:ext uri="{28A0092B-C50C-407E-A947-70E740481C1C}">
-                <a14:useLocalDpi xmlns:a14="http://schemas.microsoft.com/office/drawing/2010/main" val="0"/>
-              </a:ext>
-            </a:extLst>
-          </a:blip>
-          <a:srcRect/>
+          <a:blip r:embed="rId2"/>
           <a:stretch>
             <a:fillRect/>
           </a:stretch>
         </p:blipFill>
-        <p:spPr bwMode="auto">
+        <p:spPr>
           <a:xfrm>
-            <a:off x="7394390" y="3120272"/>
-            <a:ext cx="4088734" cy="3191628"/>
+            <a:off x="548655" y="1559579"/>
+            <a:ext cx="11307753" cy="2000529"/>
           </a:xfrm>
           <a:prstGeom prst="rect">
             <a:avLst/>
           </a:prstGeom>
-          <a:noFill/>
-          <a:extLst>
-            <a:ext uri="{909E8E84-426E-40DD-AFC4-6F175D3DCCD1}">
-              <a14:hiddenFill xmlns:a14="http://schemas.microsoft.com/office/drawing/2010/main">
-                <a:solidFill>
-                  <a:srgbClr val="FFFFFF"/>
-                </a:solidFill>
-              </a14:hiddenFill>
-            </a:ext>
-          </a:extLst>
         </p:spPr>
       </p:pic>
       <p:sp>
         <p:nvSpPr>
-          <p:cNvPr id="4" name="Tekstvak 3">
-            <a:extLst>
-              <a:ext uri="{FF2B5EF4-FFF2-40B4-BE49-F238E27FC236}">
-                <a16:creationId xmlns:a16="http://schemas.microsoft.com/office/drawing/2014/main" id="{143CA62C-E5F8-B595-8B34-FC4F834A9C68}"/>
-              </a:ext>
-            </a:extLst>
-          </p:cNvPr>
-          <p:cNvSpPr txBox="1"/>
+          <p:cNvPr id="6" name="Ovaal 5">
+            <a:extLst>
+              <a:ext uri="{FF2B5EF4-FFF2-40B4-BE49-F238E27FC236}">
+                <a16:creationId xmlns:a16="http://schemas.microsoft.com/office/drawing/2014/main" id="{C76AC978-7C71-5520-B3E8-185FA89D33E7}"/>
+              </a:ext>
+            </a:extLst>
+          </p:cNvPr>
+          <p:cNvSpPr/>
           <p:nvPr/>
         </p:nvSpPr>
         <p:spPr>
           <a:xfrm>
-            <a:off x="7394390" y="6311900"/>
-            <a:ext cx="4088734" cy="369332"/>
+            <a:off x="5539664" y="2452293"/>
+            <a:ext cx="2681057" cy="432849"/>
           </a:xfrm>
-          <a:prstGeom prst="rect">
+          <a:prstGeom prst="ellipse">
             <a:avLst/>
           </a:prstGeom>
           <a:noFill/>
+          <a:ln w="28575">
+            <a:solidFill>
+              <a:srgbClr val="FF0000"/>
+            </a:solidFill>
+          </a:ln>
         </p:spPr>
-        <p:txBody>
-          <a:bodyPr wrap="square" rtlCol="0">
-            <a:spAutoFit/>
-          </a:bodyPr>
-          <a:lstStyle/>
-          <a:p>
-            <a:r>
-              <a:rPr lang="nl-NL" i="1"/>
-              <a:t>Bron: researchgate.net</a:t>
-            </a:r>
+        <p:style>
+          <a:lnRef idx="2">
+            <a:schemeClr val="accent1">
+              <a:shade val="15000"/>
+            </a:schemeClr>
+          </a:lnRef>
+          <a:fillRef idx="1">
+            <a:schemeClr val="accent1"/>
+          </a:fillRef>
+          <a:effectRef idx="0">
+            <a:schemeClr val="accent1"/>
+          </a:effectRef>
+          <a:fontRef idx="minor">
+            <a:schemeClr val="lt1"/>
+          </a:fontRef>
+        </p:style>
+        <p:txBody>
+          <a:bodyPr rtlCol="0" anchor="ctr"/>
+          <a:lstStyle/>
+          <a:p>
+            <a:pPr algn="ctr"/>
+            <a:endParaRPr lang="nl-NL"/>
+          </a:p>
+        </p:txBody>
+      </p:sp>
+      <p:sp>
+        <p:nvSpPr>
+          <p:cNvPr id="7" name="Ovaal 6">
+            <a:extLst>
+              <a:ext uri="{FF2B5EF4-FFF2-40B4-BE49-F238E27FC236}">
+                <a16:creationId xmlns:a16="http://schemas.microsoft.com/office/drawing/2014/main" id="{57BDF7D7-1432-FD97-9EA2-992879FA4540}"/>
+              </a:ext>
+            </a:extLst>
+          </p:cNvPr>
+          <p:cNvSpPr/>
+          <p:nvPr/>
+        </p:nvSpPr>
+        <p:spPr>
+          <a:xfrm>
+            <a:off x="8345010" y="2452293"/>
+            <a:ext cx="905522" cy="432849"/>
+          </a:xfrm>
+          <a:prstGeom prst="ellipse">
+            <a:avLst/>
+          </a:prstGeom>
+          <a:noFill/>
+          <a:ln w="28575">
+            <a:solidFill>
+              <a:srgbClr val="FF0000"/>
+            </a:solidFill>
+          </a:ln>
+        </p:spPr>
+        <p:style>
+          <a:lnRef idx="2">
+            <a:schemeClr val="accent1">
+              <a:shade val="15000"/>
+            </a:schemeClr>
+          </a:lnRef>
+          <a:fillRef idx="1">
+            <a:schemeClr val="accent1"/>
+          </a:fillRef>
+          <a:effectRef idx="0">
+            <a:schemeClr val="accent1"/>
+          </a:effectRef>
+          <a:fontRef idx="minor">
+            <a:schemeClr val="lt1"/>
+          </a:fontRef>
+        </p:style>
+        <p:txBody>
+          <a:bodyPr rtlCol="0" anchor="ctr"/>
+          <a:lstStyle/>
+          <a:p>
+            <a:pPr algn="ctr"/>
+            <a:endParaRPr lang="nl-NL"/>
+          </a:p>
+        </p:txBody>
+      </p:sp>
+      <p:sp>
+        <p:nvSpPr>
+          <p:cNvPr id="8" name="Ovaal 7">
+            <a:extLst>
+              <a:ext uri="{FF2B5EF4-FFF2-40B4-BE49-F238E27FC236}">
+                <a16:creationId xmlns:a16="http://schemas.microsoft.com/office/drawing/2014/main" id="{B57A95C3-3631-72F6-5ED1-EBAD65C469B0}"/>
+              </a:ext>
+            </a:extLst>
+          </p:cNvPr>
+          <p:cNvSpPr/>
+          <p:nvPr/>
+        </p:nvSpPr>
+        <p:spPr>
+          <a:xfrm>
+            <a:off x="2752077" y="2769833"/>
+            <a:ext cx="905523" cy="432849"/>
+          </a:xfrm>
+          <a:prstGeom prst="ellipse">
+            <a:avLst/>
+          </a:prstGeom>
+          <a:noFill/>
+          <a:ln w="28575">
+            <a:solidFill>
+              <a:srgbClr val="FF0000"/>
+            </a:solidFill>
+          </a:ln>
+        </p:spPr>
+        <p:style>
+          <a:lnRef idx="2">
+            <a:schemeClr val="accent1">
+              <a:shade val="15000"/>
+            </a:schemeClr>
+          </a:lnRef>
+          <a:fillRef idx="1">
+            <a:schemeClr val="accent1"/>
+          </a:fillRef>
+          <a:effectRef idx="0">
+            <a:schemeClr val="accent1"/>
+          </a:effectRef>
+          <a:fontRef idx="minor">
+            <a:schemeClr val="lt1"/>
+          </a:fontRef>
+        </p:style>
+        <p:txBody>
+          <a:bodyPr rtlCol="0" anchor="ctr"/>
+          <a:lstStyle/>
+          <a:p>
+            <a:pPr algn="ctr"/>
+            <a:endParaRPr lang="nl-NL"/>
           </a:p>
         </p:txBody>
       </p:sp>
     </p:spTree>
     <p:extLst>
       <p:ext uri="{BB962C8B-B14F-4D97-AF65-F5344CB8AC3E}">
-        <p14:creationId xmlns:p14="http://schemas.microsoft.com/office/powerpoint/2010/main" val="2179929126"/>
+        <p14:creationId xmlns:p14="http://schemas.microsoft.com/office/powerpoint/2010/main" val="990753440"/>
       </p:ext>
     </p:extLst>
   </p:cSld>

</xml_diff>